<commit_message>
updated week 8 notes
</commit_message>
<xml_diff>
--- a/notes/week8/week8.pptx
+++ b/notes/week8/week8.pptx
@@ -20,8 +20,13 @@
     <p:sldId id="271" r:id="rId14"/>
     <p:sldId id="272" r:id="rId15"/>
     <p:sldId id="273" r:id="rId16"/>
-    <p:sldId id="274" r:id="rId17"/>
-    <p:sldId id="258" r:id="rId18"/>
+    <p:sldId id="275" r:id="rId17"/>
+    <p:sldId id="279" r:id="rId18"/>
+    <p:sldId id="276" r:id="rId19"/>
+    <p:sldId id="277" r:id="rId20"/>
+    <p:sldId id="278" r:id="rId21"/>
+    <p:sldId id="274" r:id="rId22"/>
+    <p:sldId id="258" r:id="rId23"/>
   </p:sldIdLst>
   <p:sldSz cx="12192000" cy="6858000"/>
   <p:notesSz cx="6858000" cy="9144000"/>
@@ -120,7 +125,440 @@
       </a:defRPr>
     </a:lvl9pPr>
   </p:defaultTextStyle>
+  <p:extLst>
+    <p:ext uri="{EFAFB233-063F-42B5-8137-9DF3F51BA10A}">
+      <p15:sldGuideLst xmlns:p15="http://schemas.microsoft.com/office/powerpoint/2012/main"/>
+    </p:ext>
+  </p:extLst>
 </p:presentation>
+</file>
+
+<file path=ppt/revisionInfo.xml><?xml version="1.0" encoding="utf-8"?>
+<p1510:revInfo xmlns:a="http://schemas.openxmlformats.org/drawingml/2006/main" xmlns:r="http://schemas.openxmlformats.org/officeDocument/2006/relationships" xmlns:p1510="http://schemas.microsoft.com/office/powerpoint/2015/10/main">
+  <p1510:revLst>
+    <p1510:client id="{6507C9E3-5D4D-2047-AC1A-48E103CA2CF4}" v="23" dt="2026-02-12T20:49:02.591"/>
+  </p1510:revLst>
+</p1510:revInfo>
+</file>
+
+<file path=ppt/changesInfos/changesInfo1.xml><?xml version="1.0" encoding="utf-8"?>
+<pc:chgInfo xmlns:a="http://schemas.openxmlformats.org/drawingml/2006/main" xmlns:r="http://schemas.openxmlformats.org/officeDocument/2006/relationships" xmlns:ac="http://schemas.microsoft.com/office/drawing/2013/main/command" xmlns:pc="http://schemas.microsoft.com/office/powerpoint/2013/main/command">
+  <pc:docChgLst>
+    <pc:chgData name="Toby Donaldson" userId="2e6e5431-bb17-4c41-9985-d39c50d83c73" providerId="ADAL" clId="{7F9681A8-EEE2-56F4-9B39-ECCBEE0471AC}"/>
+    <pc:docChg chg="custSel addSld delSld modSld">
+      <pc:chgData name="Toby Donaldson" userId="2e6e5431-bb17-4c41-9985-d39c50d83c73" providerId="ADAL" clId="{7F9681A8-EEE2-56F4-9B39-ECCBEE0471AC}" dt="2026-02-12T20:49:16.394" v="804" actId="21"/>
+      <pc:docMkLst>
+        <pc:docMk/>
+      </pc:docMkLst>
+      <pc:sldChg chg="addSp modSp">
+        <pc:chgData name="Toby Donaldson" userId="2e6e5431-bb17-4c41-9985-d39c50d83c73" providerId="ADAL" clId="{7F9681A8-EEE2-56F4-9B39-ECCBEE0471AC}" dt="2026-02-12T20:37:28.811" v="45"/>
+        <pc:sldMkLst>
+          <pc:docMk/>
+          <pc:sldMk cId="586440292" sldId="259"/>
+        </pc:sldMkLst>
+        <pc:spChg chg="add mod">
+          <ac:chgData name="Toby Donaldson" userId="2e6e5431-bb17-4c41-9985-d39c50d83c73" providerId="ADAL" clId="{7F9681A8-EEE2-56F4-9B39-ECCBEE0471AC}" dt="2026-02-12T20:37:28.811" v="45"/>
+          <ac:spMkLst>
+            <pc:docMk/>
+            <pc:sldMk cId="586440292" sldId="259"/>
+            <ac:spMk id="5" creationId="{F98E20C7-B854-DA92-FAE2-DC12BE695F20}"/>
+          </ac:spMkLst>
+        </pc:spChg>
+      </pc:sldChg>
+      <pc:sldChg chg="addSp delSp modSp add del mod">
+        <pc:chgData name="Toby Donaldson" userId="2e6e5431-bb17-4c41-9985-d39c50d83c73" providerId="ADAL" clId="{7F9681A8-EEE2-56F4-9B39-ECCBEE0471AC}" dt="2026-02-12T20:48:56.916" v="801" actId="2696"/>
+        <pc:sldMkLst>
+          <pc:docMk/>
+          <pc:sldMk cId="362482407" sldId="275"/>
+        </pc:sldMkLst>
+        <pc:spChg chg="del">
+          <ac:chgData name="Toby Donaldson" userId="2e6e5431-bb17-4c41-9985-d39c50d83c73" providerId="ADAL" clId="{7F9681A8-EEE2-56F4-9B39-ECCBEE0471AC}" dt="2026-02-12T20:35:28.923" v="1" actId="21"/>
+          <ac:spMkLst>
+            <pc:docMk/>
+            <pc:sldMk cId="362482407" sldId="275"/>
+            <ac:spMk id="3" creationId="{DC8820E8-B130-7F1B-B84C-88AA0ABEC804}"/>
+          </ac:spMkLst>
+        </pc:spChg>
+        <pc:spChg chg="add del mod">
+          <ac:chgData name="Toby Donaldson" userId="2e6e5431-bb17-4c41-9985-d39c50d83c73" providerId="ADAL" clId="{7F9681A8-EEE2-56F4-9B39-ECCBEE0471AC}" dt="2026-02-12T20:35:34.679" v="2" actId="21"/>
+          <ac:spMkLst>
+            <pc:docMk/>
+            <pc:sldMk cId="362482407" sldId="275"/>
+            <ac:spMk id="5" creationId="{0D5570C5-AF3F-0715-0ABD-5320E7A91296}"/>
+          </ac:spMkLst>
+        </pc:spChg>
+        <pc:spChg chg="add mod">
+          <ac:chgData name="Toby Donaldson" userId="2e6e5431-bb17-4c41-9985-d39c50d83c73" providerId="ADAL" clId="{7F9681A8-EEE2-56F4-9B39-ECCBEE0471AC}" dt="2026-02-12T20:38:42.323" v="160" actId="1076"/>
+          <ac:spMkLst>
+            <pc:docMk/>
+            <pc:sldMk cId="362482407" sldId="275"/>
+            <ac:spMk id="6" creationId="{672B5CAB-943F-8541-5DC8-2AC5701F708B}"/>
+          </ac:spMkLst>
+        </pc:spChg>
+        <pc:spChg chg="add mod">
+          <ac:chgData name="Toby Donaldson" userId="2e6e5431-bb17-4c41-9985-d39c50d83c73" providerId="ADAL" clId="{7F9681A8-EEE2-56F4-9B39-ECCBEE0471AC}" dt="2026-02-12T20:39:26.718" v="169" actId="20577"/>
+          <ac:spMkLst>
+            <pc:docMk/>
+            <pc:sldMk cId="362482407" sldId="275"/>
+            <ac:spMk id="10" creationId="{86AC40DA-99A6-8ED6-9BB7-29B82392D4F9}"/>
+          </ac:spMkLst>
+        </pc:spChg>
+        <pc:spChg chg="add mod">
+          <ac:chgData name="Toby Donaldson" userId="2e6e5431-bb17-4c41-9985-d39c50d83c73" providerId="ADAL" clId="{7F9681A8-EEE2-56F4-9B39-ECCBEE0471AC}" dt="2026-02-12T20:38:56.738" v="162" actId="12788"/>
+          <ac:spMkLst>
+            <pc:docMk/>
+            <pc:sldMk cId="362482407" sldId="275"/>
+            <ac:spMk id="11" creationId="{6D5071A0-EF99-47A7-6A1D-AE8280FEF740}"/>
+          </ac:spMkLst>
+        </pc:spChg>
+        <pc:spChg chg="add mod">
+          <ac:chgData name="Toby Donaldson" userId="2e6e5431-bb17-4c41-9985-d39c50d83c73" providerId="ADAL" clId="{7F9681A8-EEE2-56F4-9B39-ECCBEE0471AC}" dt="2026-02-12T20:38:56.738" v="162" actId="12788"/>
+          <ac:spMkLst>
+            <pc:docMk/>
+            <pc:sldMk cId="362482407" sldId="275"/>
+            <ac:spMk id="12" creationId="{D406DD90-A30D-6509-E587-C79C71DA1CD4}"/>
+          </ac:spMkLst>
+        </pc:spChg>
+        <pc:spChg chg="add mod">
+          <ac:chgData name="Toby Donaldson" userId="2e6e5431-bb17-4c41-9985-d39c50d83c73" providerId="ADAL" clId="{7F9681A8-EEE2-56F4-9B39-ECCBEE0471AC}" dt="2026-02-12T20:38:56.738" v="162" actId="12788"/>
+          <ac:spMkLst>
+            <pc:docMk/>
+            <pc:sldMk cId="362482407" sldId="275"/>
+            <ac:spMk id="13" creationId="{F03E543F-6238-E16C-3EF6-0A80FE6ABD9F}"/>
+          </ac:spMkLst>
+        </pc:spChg>
+        <pc:spChg chg="add mod">
+          <ac:chgData name="Toby Donaldson" userId="2e6e5431-bb17-4c41-9985-d39c50d83c73" providerId="ADAL" clId="{7F9681A8-EEE2-56F4-9B39-ECCBEE0471AC}" dt="2026-02-12T20:38:56.738" v="162" actId="12788"/>
+          <ac:spMkLst>
+            <pc:docMk/>
+            <pc:sldMk cId="362482407" sldId="275"/>
+            <ac:spMk id="14" creationId="{F9A87772-E9B6-F578-1239-01C39DE4561A}"/>
+          </ac:spMkLst>
+        </pc:spChg>
+        <pc:spChg chg="add mod">
+          <ac:chgData name="Toby Donaldson" userId="2e6e5431-bb17-4c41-9985-d39c50d83c73" providerId="ADAL" clId="{7F9681A8-EEE2-56F4-9B39-ECCBEE0471AC}" dt="2026-02-12T20:39:09.768" v="164" actId="1076"/>
+          <ac:spMkLst>
+            <pc:docMk/>
+            <pc:sldMk cId="362482407" sldId="275"/>
+            <ac:spMk id="15" creationId="{2D2FE4DE-AD04-C1BA-0B13-A61E90B3387F}"/>
+          </ac:spMkLst>
+        </pc:spChg>
+        <pc:spChg chg="add mod">
+          <ac:chgData name="Toby Donaldson" userId="2e6e5431-bb17-4c41-9985-d39c50d83c73" providerId="ADAL" clId="{7F9681A8-EEE2-56F4-9B39-ECCBEE0471AC}" dt="2026-02-12T20:40:46.341" v="269" actId="1076"/>
+          <ac:spMkLst>
+            <pc:docMk/>
+            <pc:sldMk cId="362482407" sldId="275"/>
+            <ac:spMk id="18" creationId="{93463436-2419-3A8D-D180-EC377ED3E760}"/>
+          </ac:spMkLst>
+        </pc:spChg>
+        <pc:grpChg chg="add mod">
+          <ac:chgData name="Toby Donaldson" userId="2e6e5431-bb17-4c41-9985-d39c50d83c73" providerId="ADAL" clId="{7F9681A8-EEE2-56F4-9B39-ECCBEE0471AC}" dt="2026-02-12T20:39:32.290" v="170" actId="1076"/>
+          <ac:grpSpMkLst>
+            <pc:docMk/>
+            <pc:sldMk cId="362482407" sldId="275"/>
+            <ac:grpSpMk id="9" creationId="{EE484824-0380-F376-59D9-51C4B655DA89}"/>
+          </ac:grpSpMkLst>
+        </pc:grpChg>
+        <pc:cxnChg chg="add mod">
+          <ac:chgData name="Toby Donaldson" userId="2e6e5431-bb17-4c41-9985-d39c50d83c73" providerId="ADAL" clId="{7F9681A8-EEE2-56F4-9B39-ECCBEE0471AC}" dt="2026-02-12T20:36:03.167" v="17" actId="164"/>
+          <ac:cxnSpMkLst>
+            <pc:docMk/>
+            <pc:sldMk cId="362482407" sldId="275"/>
+            <ac:cxnSpMk id="8" creationId="{32BEDFC0-D338-C52A-F27B-065C33E01863}"/>
+          </ac:cxnSpMkLst>
+        </pc:cxnChg>
+        <pc:cxnChg chg="add">
+          <ac:chgData name="Toby Donaldson" userId="2e6e5431-bb17-4c41-9985-d39c50d83c73" providerId="ADAL" clId="{7F9681A8-EEE2-56F4-9B39-ECCBEE0471AC}" dt="2026-02-12T20:39:15.389" v="165" actId="11529"/>
+          <ac:cxnSpMkLst>
+            <pc:docMk/>
+            <pc:sldMk cId="362482407" sldId="275"/>
+            <ac:cxnSpMk id="17" creationId="{A07CDD4C-16F4-F537-2804-88F78529F217}"/>
+          </ac:cxnSpMkLst>
+        </pc:cxnChg>
+        <pc:cxnChg chg="add mod">
+          <ac:chgData name="Toby Donaldson" userId="2e6e5431-bb17-4c41-9985-d39c50d83c73" providerId="ADAL" clId="{7F9681A8-EEE2-56F4-9B39-ECCBEE0471AC}" dt="2026-02-12T20:40:54.441" v="272" actId="14100"/>
+          <ac:cxnSpMkLst>
+            <pc:docMk/>
+            <pc:sldMk cId="362482407" sldId="275"/>
+            <ac:cxnSpMk id="19" creationId="{9F106048-C46C-20E4-15A5-1A384E5ACC04}"/>
+          </ac:cxnSpMkLst>
+        </pc:cxnChg>
+      </pc:sldChg>
+      <pc:sldChg chg="delSp modSp add mod">
+        <pc:chgData name="Toby Donaldson" userId="2e6e5431-bb17-4c41-9985-d39c50d83c73" providerId="ADAL" clId="{7F9681A8-EEE2-56F4-9B39-ECCBEE0471AC}" dt="2026-02-12T20:49:16.394" v="804" actId="21"/>
+        <pc:sldMkLst>
+          <pc:docMk/>
+          <pc:sldMk cId="3363051257" sldId="275"/>
+        </pc:sldMkLst>
+        <pc:spChg chg="del">
+          <ac:chgData name="Toby Donaldson" userId="2e6e5431-bb17-4c41-9985-d39c50d83c73" providerId="ADAL" clId="{7F9681A8-EEE2-56F4-9B39-ECCBEE0471AC}" dt="2026-02-12T20:49:16.394" v="804" actId="21"/>
+          <ac:spMkLst>
+            <pc:docMk/>
+            <pc:sldMk cId="3363051257" sldId="275"/>
+            <ac:spMk id="18" creationId="{93463436-2419-3A8D-D180-EC377ED3E760}"/>
+          </ac:spMkLst>
+        </pc:spChg>
+        <pc:cxnChg chg="del mod">
+          <ac:chgData name="Toby Donaldson" userId="2e6e5431-bb17-4c41-9985-d39c50d83c73" providerId="ADAL" clId="{7F9681A8-EEE2-56F4-9B39-ECCBEE0471AC}" dt="2026-02-12T20:49:16.394" v="804" actId="21"/>
+          <ac:cxnSpMkLst>
+            <pc:docMk/>
+            <pc:sldMk cId="3363051257" sldId="275"/>
+            <ac:cxnSpMk id="19" creationId="{9F106048-C46C-20E4-15A5-1A384E5ACC04}"/>
+          </ac:cxnSpMkLst>
+        </pc:cxnChg>
+      </pc:sldChg>
+      <pc:sldChg chg="add">
+        <pc:chgData name="Toby Donaldson" userId="2e6e5431-bb17-4c41-9985-d39c50d83c73" providerId="ADAL" clId="{7F9681A8-EEE2-56F4-9B39-ECCBEE0471AC}" dt="2026-02-12T20:49:02.591" v="802"/>
+        <pc:sldMkLst>
+          <pc:docMk/>
+          <pc:sldMk cId="493803107" sldId="276"/>
+        </pc:sldMkLst>
+      </pc:sldChg>
+      <pc:sldChg chg="addSp delSp modSp add del mod">
+        <pc:chgData name="Toby Donaldson" userId="2e6e5431-bb17-4c41-9985-d39c50d83c73" providerId="ADAL" clId="{7F9681A8-EEE2-56F4-9B39-ECCBEE0471AC}" dt="2026-02-12T20:48:56.916" v="801" actId="2696"/>
+        <pc:sldMkLst>
+          <pc:docMk/>
+          <pc:sldMk cId="1876958373" sldId="276"/>
+        </pc:sldMkLst>
+        <pc:spChg chg="add mod">
+          <ac:chgData name="Toby Donaldson" userId="2e6e5431-bb17-4c41-9985-d39c50d83c73" providerId="ADAL" clId="{7F9681A8-EEE2-56F4-9B39-ECCBEE0471AC}" dt="2026-02-12T20:42:53.412" v="430" actId="692"/>
+          <ac:spMkLst>
+            <pc:docMk/>
+            <pc:sldMk cId="1876958373" sldId="276"/>
+            <ac:spMk id="3" creationId="{3F93B91E-E18A-83DF-81F7-C1BAAE61D9B4}"/>
+          </ac:spMkLst>
+        </pc:spChg>
+        <pc:spChg chg="mod">
+          <ac:chgData name="Toby Donaldson" userId="2e6e5431-bb17-4c41-9985-d39c50d83c73" providerId="ADAL" clId="{7F9681A8-EEE2-56F4-9B39-ECCBEE0471AC}" dt="2026-02-12T20:43:02.024" v="431" actId="1076"/>
+          <ac:spMkLst>
+            <pc:docMk/>
+            <pc:sldMk cId="1876958373" sldId="276"/>
+            <ac:spMk id="18" creationId="{6FC9A874-BEB9-268A-2B46-84A1C648C597}"/>
+          </ac:spMkLst>
+        </pc:spChg>
+        <pc:cxnChg chg="del mod">
+          <ac:chgData name="Toby Donaldson" userId="2e6e5431-bb17-4c41-9985-d39c50d83c73" providerId="ADAL" clId="{7F9681A8-EEE2-56F4-9B39-ECCBEE0471AC}" dt="2026-02-12T20:42:24.194" v="428" actId="21"/>
+          <ac:cxnSpMkLst>
+            <pc:docMk/>
+            <pc:sldMk cId="1876958373" sldId="276"/>
+            <ac:cxnSpMk id="19" creationId="{80C38827-AD36-CBAE-65BF-A5B765D1BDC7}"/>
+          </ac:cxnSpMkLst>
+        </pc:cxnChg>
+      </pc:sldChg>
+      <pc:sldChg chg="add">
+        <pc:chgData name="Toby Donaldson" userId="2e6e5431-bb17-4c41-9985-d39c50d83c73" providerId="ADAL" clId="{7F9681A8-EEE2-56F4-9B39-ECCBEE0471AC}" dt="2026-02-12T20:49:02.591" v="802"/>
+        <pc:sldMkLst>
+          <pc:docMk/>
+          <pc:sldMk cId="1825712921" sldId="277"/>
+        </pc:sldMkLst>
+      </pc:sldChg>
+      <pc:sldChg chg="addSp delSp modSp add del mod">
+        <pc:chgData name="Toby Donaldson" userId="2e6e5431-bb17-4c41-9985-d39c50d83c73" providerId="ADAL" clId="{7F9681A8-EEE2-56F4-9B39-ECCBEE0471AC}" dt="2026-02-12T20:48:56.916" v="801" actId="2696"/>
+        <pc:sldMkLst>
+          <pc:docMk/>
+          <pc:sldMk cId="1988495460" sldId="277"/>
+        </pc:sldMkLst>
+        <pc:spChg chg="del mod">
+          <ac:chgData name="Toby Donaldson" userId="2e6e5431-bb17-4c41-9985-d39c50d83c73" providerId="ADAL" clId="{7F9681A8-EEE2-56F4-9B39-ECCBEE0471AC}" dt="2026-02-12T20:44:38.148" v="555" actId="21"/>
+          <ac:spMkLst>
+            <pc:docMk/>
+            <pc:sldMk cId="1988495460" sldId="277"/>
+            <ac:spMk id="3" creationId="{E2FC21EB-8232-4363-82FF-5EF274020CA2}"/>
+          </ac:spMkLst>
+        </pc:spChg>
+        <pc:spChg chg="del">
+          <ac:chgData name="Toby Donaldson" userId="2e6e5431-bb17-4c41-9985-d39c50d83c73" providerId="ADAL" clId="{7F9681A8-EEE2-56F4-9B39-ECCBEE0471AC}" dt="2026-02-12T20:43:12.910" v="433" actId="21"/>
+          <ac:spMkLst>
+            <pc:docMk/>
+            <pc:sldMk cId="1988495460" sldId="277"/>
+            <ac:spMk id="15" creationId="{900CE980-51F2-DD84-DD8B-E7CC1598BFC1}"/>
+          </ac:spMkLst>
+        </pc:spChg>
+        <pc:spChg chg="mod">
+          <ac:chgData name="Toby Donaldson" userId="2e6e5431-bb17-4c41-9985-d39c50d83c73" providerId="ADAL" clId="{7F9681A8-EEE2-56F4-9B39-ECCBEE0471AC}" dt="2026-02-12T20:44:43.391" v="558" actId="1076"/>
+          <ac:spMkLst>
+            <pc:docMk/>
+            <pc:sldMk cId="1988495460" sldId="277"/>
+            <ac:spMk id="18" creationId="{95721E0A-D535-B634-D127-D4FD27A340C0}"/>
+          </ac:spMkLst>
+        </pc:spChg>
+        <pc:spChg chg="add del mod">
+          <ac:chgData name="Toby Donaldson" userId="2e6e5431-bb17-4c41-9985-d39c50d83c73" providerId="ADAL" clId="{7F9681A8-EEE2-56F4-9B39-ECCBEE0471AC}" dt="2026-02-12T20:44:39.124" v="557"/>
+          <ac:spMkLst>
+            <pc:docMk/>
+            <pc:sldMk cId="1988495460" sldId="277"/>
+            <ac:spMk id="20" creationId="{B35522EC-C35C-B175-2E16-E5E429BEF8AC}"/>
+          </ac:spMkLst>
+        </pc:spChg>
+        <pc:grpChg chg="add mod">
+          <ac:chgData name="Toby Donaldson" userId="2e6e5431-bb17-4c41-9985-d39c50d83c73" providerId="ADAL" clId="{7F9681A8-EEE2-56F4-9B39-ECCBEE0471AC}" dt="2026-02-12T20:43:47.958" v="441" actId="1076"/>
+          <ac:grpSpMkLst>
+            <pc:docMk/>
+            <pc:sldMk cId="1988495460" sldId="277"/>
+            <ac:grpSpMk id="21" creationId="{D257EF72-815C-953C-D423-8004E28F1B82}"/>
+          </ac:grpSpMkLst>
+        </pc:grpChg>
+        <pc:cxnChg chg="add mod">
+          <ac:chgData name="Toby Donaldson" userId="2e6e5431-bb17-4c41-9985-d39c50d83c73" providerId="ADAL" clId="{7F9681A8-EEE2-56F4-9B39-ECCBEE0471AC}" dt="2026-02-12T20:43:43.995" v="440" actId="164"/>
+          <ac:cxnSpMkLst>
+            <pc:docMk/>
+            <pc:sldMk cId="1988495460" sldId="277"/>
+            <ac:cxnSpMk id="5" creationId="{B5DFF8A8-15D2-DE2A-8B6F-ABA836C6DF35}"/>
+          </ac:cxnSpMkLst>
+        </pc:cxnChg>
+        <pc:cxnChg chg="add mod">
+          <ac:chgData name="Toby Donaldson" userId="2e6e5431-bb17-4c41-9985-d39c50d83c73" providerId="ADAL" clId="{7F9681A8-EEE2-56F4-9B39-ECCBEE0471AC}" dt="2026-02-12T20:43:43.995" v="440" actId="164"/>
+          <ac:cxnSpMkLst>
+            <pc:docMk/>
+            <pc:sldMk cId="1988495460" sldId="277"/>
+            <ac:cxnSpMk id="7" creationId="{FC6BD7C3-1E0D-A1C6-6E8A-8A7963D0CFF1}"/>
+          </ac:cxnSpMkLst>
+        </pc:cxnChg>
+        <pc:cxnChg chg="del mod">
+          <ac:chgData name="Toby Donaldson" userId="2e6e5431-bb17-4c41-9985-d39c50d83c73" providerId="ADAL" clId="{7F9681A8-EEE2-56F4-9B39-ECCBEE0471AC}" dt="2026-02-12T20:43:12.910" v="433" actId="21"/>
+          <ac:cxnSpMkLst>
+            <pc:docMk/>
+            <pc:sldMk cId="1988495460" sldId="277"/>
+            <ac:cxnSpMk id="17" creationId="{F70CC916-A0E4-B4F3-5622-366B63B6649F}"/>
+          </ac:cxnSpMkLst>
+        </pc:cxnChg>
+        <pc:cxnChg chg="add">
+          <ac:chgData name="Toby Donaldson" userId="2e6e5431-bb17-4c41-9985-d39c50d83c73" providerId="ADAL" clId="{7F9681A8-EEE2-56F4-9B39-ECCBEE0471AC}" dt="2026-02-12T20:44:53.170" v="559" actId="11529"/>
+          <ac:cxnSpMkLst>
+            <pc:docMk/>
+            <pc:sldMk cId="1988495460" sldId="277"/>
+            <ac:cxnSpMk id="23" creationId="{CE201D48-21CA-59D0-6B98-8D858EE9CF85}"/>
+          </ac:cxnSpMkLst>
+        </pc:cxnChg>
+      </pc:sldChg>
+      <pc:sldChg chg="add">
+        <pc:chgData name="Toby Donaldson" userId="2e6e5431-bb17-4c41-9985-d39c50d83c73" providerId="ADAL" clId="{7F9681A8-EEE2-56F4-9B39-ECCBEE0471AC}" dt="2026-02-12T20:49:02.591" v="802"/>
+        <pc:sldMkLst>
+          <pc:docMk/>
+          <pc:sldMk cId="884525296" sldId="278"/>
+        </pc:sldMkLst>
+      </pc:sldChg>
+      <pc:sldChg chg="addSp delSp modSp add del mod">
+        <pc:chgData name="Toby Donaldson" userId="2e6e5431-bb17-4c41-9985-d39c50d83c73" providerId="ADAL" clId="{7F9681A8-EEE2-56F4-9B39-ECCBEE0471AC}" dt="2026-02-12T20:48:56.916" v="801" actId="2696"/>
+        <pc:sldMkLst>
+          <pc:docMk/>
+          <pc:sldMk cId="3958240185" sldId="278"/>
+        </pc:sldMkLst>
+        <pc:spChg chg="add mod">
+          <ac:chgData name="Toby Donaldson" userId="2e6e5431-bb17-4c41-9985-d39c50d83c73" providerId="ADAL" clId="{7F9681A8-EEE2-56F4-9B39-ECCBEE0471AC}" dt="2026-02-12T20:46:07.501" v="687" actId="1076"/>
+          <ac:spMkLst>
+            <pc:docMk/>
+            <pc:sldMk cId="3958240185" sldId="278"/>
+            <ac:spMk id="4" creationId="{AF1C81F4-1BCE-67A3-A84B-EBC6B3CB3A6F}"/>
+          </ac:spMkLst>
+        </pc:spChg>
+        <pc:spChg chg="del">
+          <ac:chgData name="Toby Donaldson" userId="2e6e5431-bb17-4c41-9985-d39c50d83c73" providerId="ADAL" clId="{7F9681A8-EEE2-56F4-9B39-ECCBEE0471AC}" dt="2026-02-12T20:45:19.476" v="563" actId="21"/>
+          <ac:spMkLst>
+            <pc:docMk/>
+            <pc:sldMk cId="3958240185" sldId="278"/>
+            <ac:spMk id="14" creationId="{124C1728-0A21-0DC4-6D42-5E02433474D4}"/>
+          </ac:spMkLst>
+        </pc:spChg>
+        <pc:spChg chg="add mod">
+          <ac:chgData name="Toby Donaldson" userId="2e6e5431-bb17-4c41-9985-d39c50d83c73" providerId="ADAL" clId="{7F9681A8-EEE2-56F4-9B39-ECCBEE0471AC}" dt="2026-02-12T20:46:15.726" v="689" actId="1076"/>
+          <ac:spMkLst>
+            <pc:docMk/>
+            <pc:sldMk cId="3958240185" sldId="278"/>
+            <ac:spMk id="15" creationId="{A82883C9-24A9-8A1B-4184-F1D3DC52C7C2}"/>
+          </ac:spMkLst>
+        </pc:spChg>
+        <pc:spChg chg="add del mod">
+          <ac:chgData name="Toby Donaldson" userId="2e6e5431-bb17-4c41-9985-d39c50d83c73" providerId="ADAL" clId="{7F9681A8-EEE2-56F4-9B39-ECCBEE0471AC}" dt="2026-02-12T20:46:31.692" v="694" actId="21"/>
+          <ac:spMkLst>
+            <pc:docMk/>
+            <pc:sldMk cId="3958240185" sldId="278"/>
+            <ac:spMk id="16" creationId="{05A96F39-DB41-73BC-19C8-8D3C16344200}"/>
+          </ac:spMkLst>
+        </pc:spChg>
+        <pc:spChg chg="add mod">
+          <ac:chgData name="Toby Donaldson" userId="2e6e5431-bb17-4c41-9985-d39c50d83c73" providerId="ADAL" clId="{7F9681A8-EEE2-56F4-9B39-ECCBEE0471AC}" dt="2026-02-12T20:46:55.794" v="697" actId="692"/>
+          <ac:spMkLst>
+            <pc:docMk/>
+            <pc:sldMk cId="3958240185" sldId="278"/>
+            <ac:spMk id="17" creationId="{2BFA6F96-5502-4BF3-AE79-BEDFF3A57504}"/>
+          </ac:spMkLst>
+        </pc:spChg>
+        <pc:spChg chg="mod">
+          <ac:chgData name="Toby Donaldson" userId="2e6e5431-bb17-4c41-9985-d39c50d83c73" providerId="ADAL" clId="{7F9681A8-EEE2-56F4-9B39-ECCBEE0471AC}" dt="2026-02-12T20:45:53.496" v="684" actId="1076"/>
+          <ac:spMkLst>
+            <pc:docMk/>
+            <pc:sldMk cId="3958240185" sldId="278"/>
+            <ac:spMk id="18" creationId="{00B0DE62-3559-77CE-A840-B0DD5AA6D8E8}"/>
+          </ac:spMkLst>
+        </pc:spChg>
+        <pc:spChg chg="add mod">
+          <ac:chgData name="Toby Donaldson" userId="2e6e5431-bb17-4c41-9985-d39c50d83c73" providerId="ADAL" clId="{7F9681A8-EEE2-56F4-9B39-ECCBEE0471AC}" dt="2026-02-12T20:47:28.426" v="700" actId="692"/>
+          <ac:spMkLst>
+            <pc:docMk/>
+            <pc:sldMk cId="3958240185" sldId="278"/>
+            <ac:spMk id="19" creationId="{C484F1E2-09DB-BDC9-AB8F-2EA17D21F1CE}"/>
+          </ac:spMkLst>
+        </pc:spChg>
+        <pc:spChg chg="add mod">
+          <ac:chgData name="Toby Donaldson" userId="2e6e5431-bb17-4c41-9985-d39c50d83c73" providerId="ADAL" clId="{7F9681A8-EEE2-56F4-9B39-ECCBEE0471AC}" dt="2026-02-12T20:47:45.144" v="710" actId="1076"/>
+          <ac:spMkLst>
+            <pc:docMk/>
+            <pc:sldMk cId="3958240185" sldId="278"/>
+            <ac:spMk id="20" creationId="{E4486A5A-BAC8-B4F4-CB82-D6891BC4E4DC}"/>
+          </ac:spMkLst>
+        </pc:spChg>
+        <pc:spChg chg="add mod">
+          <ac:chgData name="Toby Donaldson" userId="2e6e5431-bb17-4c41-9985-d39c50d83c73" providerId="ADAL" clId="{7F9681A8-EEE2-56F4-9B39-ECCBEE0471AC}" dt="2026-02-12T20:48:28.813" v="800" actId="14100"/>
+          <ac:spMkLst>
+            <pc:docMk/>
+            <pc:sldMk cId="3958240185" sldId="278"/>
+            <ac:spMk id="22" creationId="{7F1A72B4-64FE-1CE7-57D2-CD3E4D789187}"/>
+          </ac:spMkLst>
+        </pc:spChg>
+        <pc:grpChg chg="del">
+          <ac:chgData name="Toby Donaldson" userId="2e6e5431-bb17-4c41-9985-d39c50d83c73" providerId="ADAL" clId="{7F9681A8-EEE2-56F4-9B39-ECCBEE0471AC}" dt="2026-02-12T20:45:15.221" v="561" actId="21"/>
+          <ac:grpSpMkLst>
+            <pc:docMk/>
+            <pc:sldMk cId="3958240185" sldId="278"/>
+            <ac:grpSpMk id="21" creationId="{2E99A632-6CCE-9866-8142-24DE3F25D2EB}"/>
+          </ac:grpSpMkLst>
+        </pc:grpChg>
+        <pc:cxnChg chg="del topLvl">
+          <ac:chgData name="Toby Donaldson" userId="2e6e5431-bb17-4c41-9985-d39c50d83c73" providerId="ADAL" clId="{7F9681A8-EEE2-56F4-9B39-ECCBEE0471AC}" dt="2026-02-12T20:45:17.476" v="562" actId="21"/>
+          <ac:cxnSpMkLst>
+            <pc:docMk/>
+            <pc:sldMk cId="3958240185" sldId="278"/>
+            <ac:cxnSpMk id="5" creationId="{509CEF74-F338-97A7-4FFF-BFFE952DF18C}"/>
+          </ac:cxnSpMkLst>
+        </pc:cxnChg>
+        <pc:cxnChg chg="del topLvl">
+          <ac:chgData name="Toby Donaldson" userId="2e6e5431-bb17-4c41-9985-d39c50d83c73" providerId="ADAL" clId="{7F9681A8-EEE2-56F4-9B39-ECCBEE0471AC}" dt="2026-02-12T20:45:15.221" v="561" actId="21"/>
+          <ac:cxnSpMkLst>
+            <pc:docMk/>
+            <pc:sldMk cId="3958240185" sldId="278"/>
+            <ac:cxnSpMk id="7" creationId="{61CF42AB-F338-61A2-8DA6-039C065E44A1}"/>
+          </ac:cxnSpMkLst>
+        </pc:cxnChg>
+        <pc:cxnChg chg="del mod">
+          <ac:chgData name="Toby Donaldson" userId="2e6e5431-bb17-4c41-9985-d39c50d83c73" providerId="ADAL" clId="{7F9681A8-EEE2-56F4-9B39-ECCBEE0471AC}" dt="2026-02-12T20:45:55.282" v="685" actId="21"/>
+          <ac:cxnSpMkLst>
+            <pc:docMk/>
+            <pc:sldMk cId="3958240185" sldId="278"/>
+            <ac:cxnSpMk id="23" creationId="{BDA56A63-C584-2EF5-FA10-470C5D3CCCBB}"/>
+          </ac:cxnSpMkLst>
+        </pc:cxnChg>
+      </pc:sldChg>
+      <pc:sldChg chg="add">
+        <pc:chgData name="Toby Donaldson" userId="2e6e5431-bb17-4c41-9985-d39c50d83c73" providerId="ADAL" clId="{7F9681A8-EEE2-56F4-9B39-ECCBEE0471AC}" dt="2026-02-12T20:49:12.099" v="803" actId="2890"/>
+        <pc:sldMkLst>
+          <pc:docMk/>
+          <pc:sldMk cId="463700528" sldId="279"/>
+        </pc:sldMkLst>
+      </pc:sldChg>
+    </pc:docChg>
+  </pc:docChgLst>
+</pc:chgInfo>
 </file>
 
 <file path=ppt/slideLayouts/slideLayout1.xml><?xml version="1.0" encoding="utf-8"?>
@@ -6133,7 +6571,13 @@
   <p:cSld>
     <p:spTree>
       <p:nvGrpSpPr>
-        <p:cNvPr id="1" name=""/>
+        <p:cNvPr id="1" name="">
+          <a:extLst>
+            <a:ext uri="{FF2B5EF4-FFF2-40B4-BE49-F238E27FC236}">
+              <a16:creationId xmlns:a16="http://schemas.microsoft.com/office/drawing/2014/main" id="{7BD02016-372E-EDD4-B078-DBBE52A9AB0D}"/>
+            </a:ext>
+          </a:extLst>
+        </p:cNvPr>
         <p:cNvGrpSpPr/>
         <p:nvPr/>
       </p:nvGrpSpPr>
@@ -6150,7 +6594,7 @@
           <p:cNvPr id="2" name="Title 1">
             <a:extLst>
               <a:ext uri="{FF2B5EF4-FFF2-40B4-BE49-F238E27FC236}">
-                <a16:creationId xmlns:a16="http://schemas.microsoft.com/office/drawing/2014/main" id="{69D3C949-08F2-82CE-79A3-68DEB0094D36}"/>
+                <a16:creationId xmlns:a16="http://schemas.microsoft.com/office/drawing/2014/main" id="{693165A6-910C-7363-078A-EFD82C23ADB4}"/>
               </a:ext>
             </a:extLst>
           </p:cNvPr>
@@ -6173,49 +6617,375 @@
           </a:p>
         </p:txBody>
       </p:sp>
-      <p:sp>
-        <p:nvSpPr>
-          <p:cNvPr id="3" name="Content Placeholder 2">
-            <a:extLst>
-              <a:ext uri="{FF2B5EF4-FFF2-40B4-BE49-F238E27FC236}">
-                <a16:creationId xmlns:a16="http://schemas.microsoft.com/office/drawing/2014/main" id="{406C4C09-85D7-6F52-CB93-339DBA77B806}"/>
-              </a:ext>
-            </a:extLst>
-          </p:cNvPr>
-          <p:cNvSpPr>
-            <a:spLocks noGrp="1"/>
-          </p:cNvSpPr>
-          <p:nvPr>
-            <p:ph idx="1"/>
-          </p:nvPr>
-        </p:nvSpPr>
-        <p:spPr/>
-        <p:txBody>
-          <a:bodyPr/>
-          <a:lstStyle/>
-          <a:p>
-            <a:r>
-              <a:rPr lang="en-US" dirty="0"/>
-              <a:t>See </a:t>
-            </a:r>
-            <a:r>
-              <a:rPr lang="en-US" dirty="0" err="1">
-                <a:latin typeface="Consolas" panose="020B0609020204030204" pitchFamily="49" charset="0"/>
-                <a:cs typeface="Consolas" panose="020B0609020204030204" pitchFamily="49" charset="0"/>
-              </a:rPr>
-              <a:t>exception_demo.cpp</a:t>
-            </a:r>
-            <a:r>
-              <a:rPr lang="en-US" dirty="0"/>
-              <a:t> in the notes for examples …</a:t>
-            </a:r>
-          </a:p>
-        </p:txBody>
-      </p:sp>
+      <p:grpSp>
+        <p:nvGrpSpPr>
+          <p:cNvPr id="9" name="Group 8">
+            <a:extLst>
+              <a:ext uri="{FF2B5EF4-FFF2-40B4-BE49-F238E27FC236}">
+                <a16:creationId xmlns:a16="http://schemas.microsoft.com/office/drawing/2014/main" id="{EE484824-0380-F376-59D9-51C4B655DA89}"/>
+              </a:ext>
+            </a:extLst>
+          </p:cNvPr>
+          <p:cNvGrpSpPr/>
+          <p:nvPr/>
+        </p:nvGrpSpPr>
+        <p:grpSpPr>
+          <a:xfrm>
+            <a:off x="5199845" y="4882756"/>
+            <a:ext cx="1792309" cy="539958"/>
+            <a:chOff x="5055476" y="4635062"/>
+            <a:chExt cx="1792309" cy="539958"/>
+          </a:xfrm>
+        </p:grpSpPr>
+        <p:sp>
+          <p:nvSpPr>
+            <p:cNvPr id="6" name="TextBox 5">
+              <a:extLst>
+                <a:ext uri="{FF2B5EF4-FFF2-40B4-BE49-F238E27FC236}">
+                  <a16:creationId xmlns:a16="http://schemas.microsoft.com/office/drawing/2014/main" id="{672B5CAB-943F-8541-5DC8-2AC5701F708B}"/>
+                </a:ext>
+              </a:extLst>
+            </p:cNvPr>
+            <p:cNvSpPr txBox="1"/>
+            <p:nvPr/>
+          </p:nvSpPr>
+          <p:spPr>
+            <a:xfrm>
+              <a:off x="5122954" y="4651800"/>
+              <a:ext cx="1724831" cy="523220"/>
+            </a:xfrm>
+            <a:prstGeom prst="rect">
+              <a:avLst/>
+            </a:prstGeom>
+            <a:noFill/>
+          </p:spPr>
+          <p:txBody>
+            <a:bodyPr wrap="none" rtlCol="0">
+              <a:spAutoFit/>
+            </a:bodyPr>
+            <a:lstStyle/>
+            <a:p>
+              <a:r>
+                <a:rPr lang="en-US" sz="2800" dirty="0"/>
+                <a:t>Call stack</a:t>
+              </a:r>
+            </a:p>
+          </p:txBody>
+        </p:sp>
+        <p:cxnSp>
+          <p:nvCxnSpPr>
+            <p:cNvPr id="8" name="Straight Connector 7">
+              <a:extLst>
+                <a:ext uri="{FF2B5EF4-FFF2-40B4-BE49-F238E27FC236}">
+                  <a16:creationId xmlns:a16="http://schemas.microsoft.com/office/drawing/2014/main" id="{32BEDFC0-D338-C52A-F27B-065C33E01863}"/>
+                </a:ext>
+              </a:extLst>
+            </p:cNvPr>
+            <p:cNvCxnSpPr/>
+            <p:nvPr/>
+          </p:nvCxnSpPr>
+          <p:spPr>
+            <a:xfrm>
+              <a:off x="5055476" y="4635062"/>
+              <a:ext cx="1702676" cy="0"/>
+            </a:xfrm>
+            <a:prstGeom prst="line">
+              <a:avLst/>
+            </a:prstGeom>
+          </p:spPr>
+          <p:style>
+            <a:lnRef idx="2">
+              <a:schemeClr val="accent1"/>
+            </a:lnRef>
+            <a:fillRef idx="0">
+              <a:schemeClr val="accent1"/>
+            </a:fillRef>
+            <a:effectRef idx="1">
+              <a:schemeClr val="accent1"/>
+            </a:effectRef>
+            <a:fontRef idx="minor">
+              <a:schemeClr val="tx1"/>
+            </a:fontRef>
+          </p:style>
+        </p:cxnSp>
+      </p:grpSp>
+      <p:sp>
+        <p:nvSpPr>
+          <p:cNvPr id="10" name="TextBox 9">
+            <a:extLst>
+              <a:ext uri="{FF2B5EF4-FFF2-40B4-BE49-F238E27FC236}">
+                <a16:creationId xmlns:a16="http://schemas.microsoft.com/office/drawing/2014/main" id="{86AC40DA-99A6-8ED6-9BB7-29B82392D4F9}"/>
+              </a:ext>
+            </a:extLst>
+          </p:cNvPr>
+          <p:cNvSpPr txBox="1"/>
+          <p:nvPr/>
+        </p:nvSpPr>
+        <p:spPr>
+          <a:xfrm>
+            <a:off x="5563611" y="4214232"/>
+            <a:ext cx="1175322" cy="523220"/>
+          </a:xfrm>
+          <a:prstGeom prst="rect">
+            <a:avLst/>
+          </a:prstGeom>
+          <a:noFill/>
+        </p:spPr>
+        <p:txBody>
+          <a:bodyPr wrap="none" rtlCol="0">
+            <a:spAutoFit/>
+          </a:bodyPr>
+          <a:lstStyle/>
+          <a:p>
+            <a:r>
+              <a:rPr lang="en-US" sz="2800" dirty="0"/>
+              <a:t>main()</a:t>
+            </a:r>
+          </a:p>
+        </p:txBody>
+      </p:sp>
+      <p:sp>
+        <p:nvSpPr>
+          <p:cNvPr id="11" name="TextBox 10">
+            <a:extLst>
+              <a:ext uri="{FF2B5EF4-FFF2-40B4-BE49-F238E27FC236}">
+                <a16:creationId xmlns:a16="http://schemas.microsoft.com/office/drawing/2014/main" id="{6D5071A0-EF99-47A7-6A1D-AE8280FEF740}"/>
+              </a:ext>
+            </a:extLst>
+          </p:cNvPr>
+          <p:cNvSpPr txBox="1"/>
+          <p:nvPr/>
+        </p:nvSpPr>
+        <p:spPr>
+          <a:xfrm>
+            <a:off x="5751963" y="3740796"/>
+            <a:ext cx="587020" cy="523220"/>
+          </a:xfrm>
+          <a:prstGeom prst="rect">
+            <a:avLst/>
+          </a:prstGeom>
+          <a:noFill/>
+        </p:spPr>
+        <p:txBody>
+          <a:bodyPr wrap="none" rtlCol="0">
+            <a:spAutoFit/>
+          </a:bodyPr>
+          <a:lstStyle/>
+          <a:p>
+            <a:r>
+              <a:rPr lang="en-US" sz="2800" dirty="0"/>
+              <a:t>a()</a:t>
+            </a:r>
+          </a:p>
+        </p:txBody>
+      </p:sp>
+      <p:sp>
+        <p:nvSpPr>
+          <p:cNvPr id="12" name="TextBox 11">
+            <a:extLst>
+              <a:ext uri="{FF2B5EF4-FFF2-40B4-BE49-F238E27FC236}">
+                <a16:creationId xmlns:a16="http://schemas.microsoft.com/office/drawing/2014/main" id="{D406DD90-A30D-6509-E587-C79C71DA1CD4}"/>
+              </a:ext>
+            </a:extLst>
+          </p:cNvPr>
+          <p:cNvSpPr txBox="1"/>
+          <p:nvPr/>
+        </p:nvSpPr>
+        <p:spPr>
+          <a:xfrm>
+            <a:off x="5746353" y="3267360"/>
+            <a:ext cx="598241" cy="523220"/>
+          </a:xfrm>
+          <a:prstGeom prst="rect">
+            <a:avLst/>
+          </a:prstGeom>
+          <a:noFill/>
+        </p:spPr>
+        <p:txBody>
+          <a:bodyPr wrap="none" rtlCol="0">
+            <a:spAutoFit/>
+          </a:bodyPr>
+          <a:lstStyle/>
+          <a:p>
+            <a:r>
+              <a:rPr lang="en-US" sz="2800" dirty="0"/>
+              <a:t>b()</a:t>
+            </a:r>
+          </a:p>
+        </p:txBody>
+      </p:sp>
+      <p:sp>
+        <p:nvSpPr>
+          <p:cNvPr id="13" name="TextBox 12">
+            <a:extLst>
+              <a:ext uri="{FF2B5EF4-FFF2-40B4-BE49-F238E27FC236}">
+                <a16:creationId xmlns:a16="http://schemas.microsoft.com/office/drawing/2014/main" id="{F03E543F-6238-E16C-3EF6-0A80FE6ABD9F}"/>
+              </a:ext>
+            </a:extLst>
+          </p:cNvPr>
+          <p:cNvSpPr txBox="1"/>
+          <p:nvPr/>
+        </p:nvSpPr>
+        <p:spPr>
+          <a:xfrm>
+            <a:off x="5752765" y="2793924"/>
+            <a:ext cx="585417" cy="523220"/>
+          </a:xfrm>
+          <a:prstGeom prst="rect">
+            <a:avLst/>
+          </a:prstGeom>
+          <a:noFill/>
+        </p:spPr>
+        <p:txBody>
+          <a:bodyPr wrap="none" rtlCol="0">
+            <a:spAutoFit/>
+          </a:bodyPr>
+          <a:lstStyle/>
+          <a:p>
+            <a:r>
+              <a:rPr lang="en-US" sz="2800" dirty="0"/>
+              <a:t>c()</a:t>
+            </a:r>
+          </a:p>
+        </p:txBody>
+      </p:sp>
+      <p:sp>
+        <p:nvSpPr>
+          <p:cNvPr id="14" name="TextBox 13">
+            <a:extLst>
+              <a:ext uri="{FF2B5EF4-FFF2-40B4-BE49-F238E27FC236}">
+                <a16:creationId xmlns:a16="http://schemas.microsoft.com/office/drawing/2014/main" id="{F9A87772-E9B6-F578-1239-01C39DE4561A}"/>
+              </a:ext>
+            </a:extLst>
+          </p:cNvPr>
+          <p:cNvSpPr txBox="1"/>
+          <p:nvPr/>
+        </p:nvSpPr>
+        <p:spPr>
+          <a:xfrm>
+            <a:off x="5746353" y="2320488"/>
+            <a:ext cx="598241" cy="523220"/>
+          </a:xfrm>
+          <a:prstGeom prst="rect">
+            <a:avLst/>
+          </a:prstGeom>
+          <a:noFill/>
+        </p:spPr>
+        <p:txBody>
+          <a:bodyPr wrap="none" rtlCol="0">
+            <a:spAutoFit/>
+          </a:bodyPr>
+          <a:lstStyle/>
+          <a:p>
+            <a:r>
+              <a:rPr lang="en-US" sz="2800" dirty="0"/>
+              <a:t>d()</a:t>
+            </a:r>
+          </a:p>
+        </p:txBody>
+      </p:sp>
+      <p:sp>
+        <p:nvSpPr>
+          <p:cNvPr id="15" name="TextBox 14">
+            <a:extLst>
+              <a:ext uri="{FF2B5EF4-FFF2-40B4-BE49-F238E27FC236}">
+                <a16:creationId xmlns:a16="http://schemas.microsoft.com/office/drawing/2014/main" id="{2D2FE4DE-AD04-C1BA-0B13-A61E90B3387F}"/>
+              </a:ext>
+            </a:extLst>
+          </p:cNvPr>
+          <p:cNvSpPr txBox="1"/>
+          <p:nvPr/>
+        </p:nvSpPr>
+        <p:spPr>
+          <a:xfrm>
+            <a:off x="2543903" y="1690688"/>
+            <a:ext cx="2575034" cy="1200329"/>
+          </a:xfrm>
+          <a:prstGeom prst="rect">
+            <a:avLst/>
+          </a:prstGeom>
+          <a:solidFill>
+            <a:schemeClr val="accent3">
+              <a:lumMod val="20000"/>
+              <a:lumOff val="80000"/>
+            </a:schemeClr>
+          </a:solidFill>
+        </p:spPr>
+        <p:txBody>
+          <a:bodyPr wrap="square" rtlCol="0">
+            <a:spAutoFit/>
+          </a:bodyPr>
+          <a:lstStyle/>
+          <a:p>
+            <a:pPr algn="ctr"/>
+            <a:r>
+              <a:rPr lang="en-US" dirty="0">
+                <a:cs typeface="Consolas" panose="020B0609020204030204" pitchFamily="49" charset="0"/>
+              </a:rPr>
+              <a:t>Suppose function </a:t>
+            </a:r>
+            <a:r>
+              <a:rPr lang="en-US" dirty="0">
+                <a:latin typeface="Consolas" panose="020B0609020204030204" pitchFamily="49" charset="0"/>
+                <a:cs typeface="Consolas" panose="020B0609020204030204" pitchFamily="49" charset="0"/>
+              </a:rPr>
+              <a:t>d() </a:t>
+            </a:r>
+            <a:r>
+              <a:rPr lang="en-US" dirty="0">
+                <a:cs typeface="Consolas" panose="020B0609020204030204" pitchFamily="49" charset="0"/>
+              </a:rPr>
+              <a:t>throws an exception when the stack looks like this …</a:t>
+            </a:r>
+          </a:p>
+        </p:txBody>
+      </p:sp>
+      <p:cxnSp>
+        <p:nvCxnSpPr>
+          <p:cNvPr id="17" name="Straight Arrow Connector 16">
+            <a:extLst>
+              <a:ext uri="{FF2B5EF4-FFF2-40B4-BE49-F238E27FC236}">
+                <a16:creationId xmlns:a16="http://schemas.microsoft.com/office/drawing/2014/main" id="{A07CDD4C-16F4-F537-2804-88F78529F217}"/>
+              </a:ext>
+            </a:extLst>
+          </p:cNvPr>
+          <p:cNvCxnSpPr>
+            <a:stCxn id="15" idx="3"/>
+            <a:endCxn id="14" idx="1"/>
+          </p:cNvCxnSpPr>
+          <p:nvPr/>
+        </p:nvCxnSpPr>
+        <p:spPr>
+          <a:xfrm>
+            <a:off x="5118937" y="2290853"/>
+            <a:ext cx="627416" cy="291245"/>
+          </a:xfrm>
+          <a:prstGeom prst="straightConnector1">
+            <a:avLst/>
+          </a:prstGeom>
+          <a:ln>
+            <a:tailEnd type="triangle"/>
+          </a:ln>
+        </p:spPr>
+        <p:style>
+          <a:lnRef idx="2">
+            <a:schemeClr val="accent1"/>
+          </a:lnRef>
+          <a:fillRef idx="0">
+            <a:schemeClr val="accent1"/>
+          </a:fillRef>
+          <a:effectRef idx="1">
+            <a:schemeClr val="accent1"/>
+          </a:effectRef>
+          <a:fontRef idx="minor">
+            <a:schemeClr val="tx1"/>
+          </a:fontRef>
+        </p:style>
+      </p:cxnSp>
     </p:spTree>
     <p:extLst>
       <p:ext uri="{BB962C8B-B14F-4D97-AF65-F5344CB8AC3E}">
-        <p14:creationId xmlns:p14="http://schemas.microsoft.com/office/powerpoint/2010/main" val="1787469844"/>
+        <p14:creationId xmlns:p14="http://schemas.microsoft.com/office/powerpoint/2010/main" val="3363051257"/>
       </p:ext>
     </p:extLst>
   </p:cSld>
@@ -6230,7 +7000,13 @@
   <p:cSld>
     <p:spTree>
       <p:nvGrpSpPr>
-        <p:cNvPr id="1" name=""/>
+        <p:cNvPr id="1" name="">
+          <a:extLst>
+            <a:ext uri="{FF2B5EF4-FFF2-40B4-BE49-F238E27FC236}">
+              <a16:creationId xmlns:a16="http://schemas.microsoft.com/office/drawing/2014/main" id="{B9BC5834-B1E6-7952-03C3-A9C8F0FA6F30}"/>
+            </a:ext>
+          </a:extLst>
+        </p:cNvPr>
         <p:cNvGrpSpPr/>
         <p:nvPr/>
       </p:nvGrpSpPr>
@@ -6247,7 +7023,7 @@
           <p:cNvPr id="2" name="Title 1">
             <a:extLst>
               <a:ext uri="{FF2B5EF4-FFF2-40B4-BE49-F238E27FC236}">
-                <a16:creationId xmlns:a16="http://schemas.microsoft.com/office/drawing/2014/main" id="{2567A48D-1F32-1EB2-F5EA-FAF078466E2F}"/>
+                <a16:creationId xmlns:a16="http://schemas.microsoft.com/office/drawing/2014/main" id="{69557D44-60D4-E644-2D89-494C06CD3C61}"/>
               </a:ext>
             </a:extLst>
           </p:cNvPr>
@@ -6265,17 +7041,529 @@
           <a:p>
             <a:r>
               <a:rPr lang="en-US" dirty="0"/>
-              <a:t>Summary</a:t>
-            </a:r>
-          </a:p>
-        </p:txBody>
-      </p:sp>
-      <p:sp>
-        <p:nvSpPr>
-          <p:cNvPr id="3" name="Content Placeholder 2">
-            <a:extLst>
-              <a:ext uri="{FF2B5EF4-FFF2-40B4-BE49-F238E27FC236}">
-                <a16:creationId xmlns:a16="http://schemas.microsoft.com/office/drawing/2014/main" id="{2908498F-39FA-FB81-9A18-DBFB7CE03695}"/>
+              <a:t>Exceptions</a:t>
+            </a:r>
+          </a:p>
+        </p:txBody>
+      </p:sp>
+      <p:grpSp>
+        <p:nvGrpSpPr>
+          <p:cNvPr id="9" name="Group 8">
+            <a:extLst>
+              <a:ext uri="{FF2B5EF4-FFF2-40B4-BE49-F238E27FC236}">
+                <a16:creationId xmlns:a16="http://schemas.microsoft.com/office/drawing/2014/main" id="{1BCCB72C-A3CF-98B1-755C-6C0D92301213}"/>
+              </a:ext>
+            </a:extLst>
+          </p:cNvPr>
+          <p:cNvGrpSpPr/>
+          <p:nvPr/>
+        </p:nvGrpSpPr>
+        <p:grpSpPr>
+          <a:xfrm>
+            <a:off x="5199845" y="4882756"/>
+            <a:ext cx="1792309" cy="539958"/>
+            <a:chOff x="5055476" y="4635062"/>
+            <a:chExt cx="1792309" cy="539958"/>
+          </a:xfrm>
+        </p:grpSpPr>
+        <p:sp>
+          <p:nvSpPr>
+            <p:cNvPr id="6" name="TextBox 5">
+              <a:extLst>
+                <a:ext uri="{FF2B5EF4-FFF2-40B4-BE49-F238E27FC236}">
+                  <a16:creationId xmlns:a16="http://schemas.microsoft.com/office/drawing/2014/main" id="{F6F4069C-9317-1B8F-62DC-A9478E2E5643}"/>
+                </a:ext>
+              </a:extLst>
+            </p:cNvPr>
+            <p:cNvSpPr txBox="1"/>
+            <p:nvPr/>
+          </p:nvSpPr>
+          <p:spPr>
+            <a:xfrm>
+              <a:off x="5122954" y="4651800"/>
+              <a:ext cx="1724831" cy="523220"/>
+            </a:xfrm>
+            <a:prstGeom prst="rect">
+              <a:avLst/>
+            </a:prstGeom>
+            <a:noFill/>
+          </p:spPr>
+          <p:txBody>
+            <a:bodyPr wrap="none" rtlCol="0">
+              <a:spAutoFit/>
+            </a:bodyPr>
+            <a:lstStyle/>
+            <a:p>
+              <a:r>
+                <a:rPr lang="en-US" sz="2800" dirty="0"/>
+                <a:t>Call stack</a:t>
+              </a:r>
+            </a:p>
+          </p:txBody>
+        </p:sp>
+        <p:cxnSp>
+          <p:nvCxnSpPr>
+            <p:cNvPr id="8" name="Straight Connector 7">
+              <a:extLst>
+                <a:ext uri="{FF2B5EF4-FFF2-40B4-BE49-F238E27FC236}">
+                  <a16:creationId xmlns:a16="http://schemas.microsoft.com/office/drawing/2014/main" id="{E1A86890-9147-6A83-37D3-96882860323E}"/>
+                </a:ext>
+              </a:extLst>
+            </p:cNvPr>
+            <p:cNvCxnSpPr/>
+            <p:nvPr/>
+          </p:nvCxnSpPr>
+          <p:spPr>
+            <a:xfrm>
+              <a:off x="5055476" y="4635062"/>
+              <a:ext cx="1702676" cy="0"/>
+            </a:xfrm>
+            <a:prstGeom prst="line">
+              <a:avLst/>
+            </a:prstGeom>
+          </p:spPr>
+          <p:style>
+            <a:lnRef idx="2">
+              <a:schemeClr val="accent1"/>
+            </a:lnRef>
+            <a:fillRef idx="0">
+              <a:schemeClr val="accent1"/>
+            </a:fillRef>
+            <a:effectRef idx="1">
+              <a:schemeClr val="accent1"/>
+            </a:effectRef>
+            <a:fontRef idx="minor">
+              <a:schemeClr val="tx1"/>
+            </a:fontRef>
+          </p:style>
+        </p:cxnSp>
+      </p:grpSp>
+      <p:sp>
+        <p:nvSpPr>
+          <p:cNvPr id="10" name="TextBox 9">
+            <a:extLst>
+              <a:ext uri="{FF2B5EF4-FFF2-40B4-BE49-F238E27FC236}">
+                <a16:creationId xmlns:a16="http://schemas.microsoft.com/office/drawing/2014/main" id="{371095F4-354D-4237-7DEA-D0F01B028FDE}"/>
+              </a:ext>
+            </a:extLst>
+          </p:cNvPr>
+          <p:cNvSpPr txBox="1"/>
+          <p:nvPr/>
+        </p:nvSpPr>
+        <p:spPr>
+          <a:xfrm>
+            <a:off x="5563611" y="4214232"/>
+            <a:ext cx="1175322" cy="523220"/>
+          </a:xfrm>
+          <a:prstGeom prst="rect">
+            <a:avLst/>
+          </a:prstGeom>
+          <a:noFill/>
+        </p:spPr>
+        <p:txBody>
+          <a:bodyPr wrap="none" rtlCol="0">
+            <a:spAutoFit/>
+          </a:bodyPr>
+          <a:lstStyle/>
+          <a:p>
+            <a:r>
+              <a:rPr lang="en-US" sz="2800" dirty="0"/>
+              <a:t>main()</a:t>
+            </a:r>
+          </a:p>
+        </p:txBody>
+      </p:sp>
+      <p:sp>
+        <p:nvSpPr>
+          <p:cNvPr id="11" name="TextBox 10">
+            <a:extLst>
+              <a:ext uri="{FF2B5EF4-FFF2-40B4-BE49-F238E27FC236}">
+                <a16:creationId xmlns:a16="http://schemas.microsoft.com/office/drawing/2014/main" id="{C43845B3-8A5B-E2AC-0A03-0CC926216D81}"/>
+              </a:ext>
+            </a:extLst>
+          </p:cNvPr>
+          <p:cNvSpPr txBox="1"/>
+          <p:nvPr/>
+        </p:nvSpPr>
+        <p:spPr>
+          <a:xfrm>
+            <a:off x="5751963" y="3740796"/>
+            <a:ext cx="587020" cy="523220"/>
+          </a:xfrm>
+          <a:prstGeom prst="rect">
+            <a:avLst/>
+          </a:prstGeom>
+          <a:noFill/>
+        </p:spPr>
+        <p:txBody>
+          <a:bodyPr wrap="none" rtlCol="0">
+            <a:spAutoFit/>
+          </a:bodyPr>
+          <a:lstStyle/>
+          <a:p>
+            <a:r>
+              <a:rPr lang="en-US" sz="2800" dirty="0"/>
+              <a:t>a()</a:t>
+            </a:r>
+          </a:p>
+        </p:txBody>
+      </p:sp>
+      <p:sp>
+        <p:nvSpPr>
+          <p:cNvPr id="12" name="TextBox 11">
+            <a:extLst>
+              <a:ext uri="{FF2B5EF4-FFF2-40B4-BE49-F238E27FC236}">
+                <a16:creationId xmlns:a16="http://schemas.microsoft.com/office/drawing/2014/main" id="{B683ECB1-CD68-2891-E0C7-2F2D97EC68B3}"/>
+              </a:ext>
+            </a:extLst>
+          </p:cNvPr>
+          <p:cNvSpPr txBox="1"/>
+          <p:nvPr/>
+        </p:nvSpPr>
+        <p:spPr>
+          <a:xfrm>
+            <a:off x="5746353" y="3267360"/>
+            <a:ext cx="598241" cy="523220"/>
+          </a:xfrm>
+          <a:prstGeom prst="rect">
+            <a:avLst/>
+          </a:prstGeom>
+          <a:noFill/>
+        </p:spPr>
+        <p:txBody>
+          <a:bodyPr wrap="none" rtlCol="0">
+            <a:spAutoFit/>
+          </a:bodyPr>
+          <a:lstStyle/>
+          <a:p>
+            <a:r>
+              <a:rPr lang="en-US" sz="2800" dirty="0"/>
+              <a:t>b()</a:t>
+            </a:r>
+          </a:p>
+        </p:txBody>
+      </p:sp>
+      <p:sp>
+        <p:nvSpPr>
+          <p:cNvPr id="13" name="TextBox 12">
+            <a:extLst>
+              <a:ext uri="{FF2B5EF4-FFF2-40B4-BE49-F238E27FC236}">
+                <a16:creationId xmlns:a16="http://schemas.microsoft.com/office/drawing/2014/main" id="{3882CF3E-9ABB-202B-23EE-9000E20A6770}"/>
+              </a:ext>
+            </a:extLst>
+          </p:cNvPr>
+          <p:cNvSpPr txBox="1"/>
+          <p:nvPr/>
+        </p:nvSpPr>
+        <p:spPr>
+          <a:xfrm>
+            <a:off x="5752765" y="2793924"/>
+            <a:ext cx="585417" cy="523220"/>
+          </a:xfrm>
+          <a:prstGeom prst="rect">
+            <a:avLst/>
+          </a:prstGeom>
+          <a:noFill/>
+        </p:spPr>
+        <p:txBody>
+          <a:bodyPr wrap="none" rtlCol="0">
+            <a:spAutoFit/>
+          </a:bodyPr>
+          <a:lstStyle/>
+          <a:p>
+            <a:r>
+              <a:rPr lang="en-US" sz="2800" dirty="0"/>
+              <a:t>c()</a:t>
+            </a:r>
+          </a:p>
+        </p:txBody>
+      </p:sp>
+      <p:sp>
+        <p:nvSpPr>
+          <p:cNvPr id="14" name="TextBox 13">
+            <a:extLst>
+              <a:ext uri="{FF2B5EF4-FFF2-40B4-BE49-F238E27FC236}">
+                <a16:creationId xmlns:a16="http://schemas.microsoft.com/office/drawing/2014/main" id="{0373DD90-FEFD-2D37-1E77-8BF753C995F2}"/>
+              </a:ext>
+            </a:extLst>
+          </p:cNvPr>
+          <p:cNvSpPr txBox="1"/>
+          <p:nvPr/>
+        </p:nvSpPr>
+        <p:spPr>
+          <a:xfrm>
+            <a:off x="5746353" y="2320488"/>
+            <a:ext cx="598241" cy="523220"/>
+          </a:xfrm>
+          <a:prstGeom prst="rect">
+            <a:avLst/>
+          </a:prstGeom>
+          <a:noFill/>
+        </p:spPr>
+        <p:txBody>
+          <a:bodyPr wrap="none" rtlCol="0">
+            <a:spAutoFit/>
+          </a:bodyPr>
+          <a:lstStyle/>
+          <a:p>
+            <a:r>
+              <a:rPr lang="en-US" sz="2800" dirty="0"/>
+              <a:t>d()</a:t>
+            </a:r>
+          </a:p>
+        </p:txBody>
+      </p:sp>
+      <p:sp>
+        <p:nvSpPr>
+          <p:cNvPr id="15" name="TextBox 14">
+            <a:extLst>
+              <a:ext uri="{FF2B5EF4-FFF2-40B4-BE49-F238E27FC236}">
+                <a16:creationId xmlns:a16="http://schemas.microsoft.com/office/drawing/2014/main" id="{EFB2A77E-6977-6AE4-029D-99B70405289A}"/>
+              </a:ext>
+            </a:extLst>
+          </p:cNvPr>
+          <p:cNvSpPr txBox="1"/>
+          <p:nvPr/>
+        </p:nvSpPr>
+        <p:spPr>
+          <a:xfrm>
+            <a:off x="2543903" y="1690688"/>
+            <a:ext cx="2575034" cy="1200329"/>
+          </a:xfrm>
+          <a:prstGeom prst="rect">
+            <a:avLst/>
+          </a:prstGeom>
+          <a:solidFill>
+            <a:schemeClr val="accent3">
+              <a:lumMod val="20000"/>
+              <a:lumOff val="80000"/>
+            </a:schemeClr>
+          </a:solidFill>
+        </p:spPr>
+        <p:txBody>
+          <a:bodyPr wrap="square" rtlCol="0">
+            <a:spAutoFit/>
+          </a:bodyPr>
+          <a:lstStyle/>
+          <a:p>
+            <a:pPr algn="ctr"/>
+            <a:r>
+              <a:rPr lang="en-US" dirty="0">
+                <a:cs typeface="Consolas" panose="020B0609020204030204" pitchFamily="49" charset="0"/>
+              </a:rPr>
+              <a:t>Suppose function </a:t>
+            </a:r>
+            <a:r>
+              <a:rPr lang="en-US" dirty="0">
+                <a:latin typeface="Consolas" panose="020B0609020204030204" pitchFamily="49" charset="0"/>
+                <a:cs typeface="Consolas" panose="020B0609020204030204" pitchFamily="49" charset="0"/>
+              </a:rPr>
+              <a:t>d() </a:t>
+            </a:r>
+            <a:r>
+              <a:rPr lang="en-US" dirty="0">
+                <a:cs typeface="Consolas" panose="020B0609020204030204" pitchFamily="49" charset="0"/>
+              </a:rPr>
+              <a:t>throws an exception when the stack looks like this …</a:t>
+            </a:r>
+          </a:p>
+        </p:txBody>
+      </p:sp>
+      <p:cxnSp>
+        <p:nvCxnSpPr>
+          <p:cNvPr id="17" name="Straight Arrow Connector 16">
+            <a:extLst>
+              <a:ext uri="{FF2B5EF4-FFF2-40B4-BE49-F238E27FC236}">
+                <a16:creationId xmlns:a16="http://schemas.microsoft.com/office/drawing/2014/main" id="{F97C1F6A-5888-C618-4B58-E06FFAF58E63}"/>
+              </a:ext>
+            </a:extLst>
+          </p:cNvPr>
+          <p:cNvCxnSpPr>
+            <a:stCxn id="15" idx="3"/>
+            <a:endCxn id="14" idx="1"/>
+          </p:cNvCxnSpPr>
+          <p:nvPr/>
+        </p:nvCxnSpPr>
+        <p:spPr>
+          <a:xfrm>
+            <a:off x="5118937" y="2290853"/>
+            <a:ext cx="627416" cy="291245"/>
+          </a:xfrm>
+          <a:prstGeom prst="straightConnector1">
+            <a:avLst/>
+          </a:prstGeom>
+          <a:ln>
+            <a:tailEnd type="triangle"/>
+          </a:ln>
+        </p:spPr>
+        <p:style>
+          <a:lnRef idx="2">
+            <a:schemeClr val="accent1"/>
+          </a:lnRef>
+          <a:fillRef idx="0">
+            <a:schemeClr val="accent1"/>
+          </a:fillRef>
+          <a:effectRef idx="1">
+            <a:schemeClr val="accent1"/>
+          </a:effectRef>
+          <a:fontRef idx="minor">
+            <a:schemeClr val="tx1"/>
+          </a:fontRef>
+        </p:style>
+      </p:cxnSp>
+      <p:sp>
+        <p:nvSpPr>
+          <p:cNvPr id="18" name="TextBox 17">
+            <a:extLst>
+              <a:ext uri="{FF2B5EF4-FFF2-40B4-BE49-F238E27FC236}">
+                <a16:creationId xmlns:a16="http://schemas.microsoft.com/office/drawing/2014/main" id="{F0E2F8C0-F79B-B566-9838-1D580BADD2C0}"/>
+              </a:ext>
+            </a:extLst>
+          </p:cNvPr>
+          <p:cNvSpPr txBox="1"/>
+          <p:nvPr/>
+        </p:nvSpPr>
+        <p:spPr>
+          <a:xfrm>
+            <a:off x="7510040" y="915248"/>
+            <a:ext cx="2663973" cy="1200329"/>
+          </a:xfrm>
+          <a:prstGeom prst="rect">
+            <a:avLst/>
+          </a:prstGeom>
+          <a:solidFill>
+            <a:schemeClr val="accent3">
+              <a:lumMod val="20000"/>
+              <a:lumOff val="80000"/>
+            </a:schemeClr>
+          </a:solidFill>
+        </p:spPr>
+        <p:txBody>
+          <a:bodyPr wrap="square" rtlCol="0">
+            <a:spAutoFit/>
+          </a:bodyPr>
+          <a:lstStyle/>
+          <a:p>
+            <a:pPr algn="ctr"/>
+            <a:r>
+              <a:rPr lang="en-US" dirty="0">
+                <a:cs typeface="Consolas" panose="020B0609020204030204" pitchFamily="49" charset="0"/>
+              </a:rPr>
+              <a:t>If there’s a try/catch block in </a:t>
+            </a:r>
+            <a:r>
+              <a:rPr lang="en-US" dirty="0">
+                <a:latin typeface="Consolas" panose="020B0609020204030204" pitchFamily="49" charset="0"/>
+                <a:cs typeface="Consolas" panose="020B0609020204030204" pitchFamily="49" charset="0"/>
+              </a:rPr>
+              <a:t>d()</a:t>
+            </a:r>
+            <a:r>
+              <a:rPr lang="en-US" dirty="0">
+                <a:cs typeface="Consolas" panose="020B0609020204030204" pitchFamily="49" charset="0"/>
+              </a:rPr>
+              <a:t> that catches the exception, then </a:t>
+            </a:r>
+            <a:r>
+              <a:rPr lang="en-US" dirty="0">
+                <a:latin typeface="Consolas" panose="020B0609020204030204" pitchFamily="49" charset="0"/>
+                <a:cs typeface="Consolas" panose="020B0609020204030204" pitchFamily="49" charset="0"/>
+              </a:rPr>
+              <a:t>d()</a:t>
+            </a:r>
+            <a:r>
+              <a:rPr lang="en-US" dirty="0">
+                <a:cs typeface="Consolas" panose="020B0609020204030204" pitchFamily="49" charset="0"/>
+              </a:rPr>
+              <a:t> continues as usual.</a:t>
+            </a:r>
+          </a:p>
+        </p:txBody>
+      </p:sp>
+      <p:cxnSp>
+        <p:nvCxnSpPr>
+          <p:cNvPr id="19" name="Straight Arrow Connector 18">
+            <a:extLst>
+              <a:ext uri="{FF2B5EF4-FFF2-40B4-BE49-F238E27FC236}">
+                <a16:creationId xmlns:a16="http://schemas.microsoft.com/office/drawing/2014/main" id="{BAA6D78C-7F8E-855D-87C1-14B656125609}"/>
+              </a:ext>
+            </a:extLst>
+          </p:cNvPr>
+          <p:cNvCxnSpPr>
+            <a:cxnSpLocks/>
+            <a:endCxn id="14" idx="3"/>
+          </p:cNvCxnSpPr>
+          <p:nvPr/>
+        </p:nvCxnSpPr>
+        <p:spPr>
+          <a:xfrm flipH="1">
+            <a:off x="6344594" y="2114340"/>
+            <a:ext cx="1165446" cy="467758"/>
+          </a:xfrm>
+          <a:prstGeom prst="straightConnector1">
+            <a:avLst/>
+          </a:prstGeom>
+          <a:ln>
+            <a:tailEnd type="triangle"/>
+          </a:ln>
+        </p:spPr>
+        <p:style>
+          <a:lnRef idx="2">
+            <a:schemeClr val="accent1"/>
+          </a:lnRef>
+          <a:fillRef idx="0">
+            <a:schemeClr val="accent1"/>
+          </a:fillRef>
+          <a:effectRef idx="1">
+            <a:schemeClr val="accent1"/>
+          </a:effectRef>
+          <a:fontRef idx="minor">
+            <a:schemeClr val="tx1"/>
+          </a:fontRef>
+        </p:style>
+      </p:cxnSp>
+    </p:spTree>
+    <p:extLst>
+      <p:ext uri="{BB962C8B-B14F-4D97-AF65-F5344CB8AC3E}">
+        <p14:creationId xmlns:p14="http://schemas.microsoft.com/office/powerpoint/2010/main" val="463700528"/>
+      </p:ext>
+    </p:extLst>
+  </p:cSld>
+  <p:clrMapOvr>
+    <a:masterClrMapping/>
+  </p:clrMapOvr>
+</p:sld>
+</file>
+
+<file path=ppt/slides/slide18.xml><?xml version="1.0" encoding="utf-8"?>
+<p:sld xmlns:a="http://schemas.openxmlformats.org/drawingml/2006/main" xmlns:r="http://schemas.openxmlformats.org/officeDocument/2006/relationships" xmlns:p="http://schemas.openxmlformats.org/presentationml/2006/main">
+  <p:cSld>
+    <p:spTree>
+      <p:nvGrpSpPr>
+        <p:cNvPr id="1" name="">
+          <a:extLst>
+            <a:ext uri="{FF2B5EF4-FFF2-40B4-BE49-F238E27FC236}">
+              <a16:creationId xmlns:a16="http://schemas.microsoft.com/office/drawing/2014/main" id="{10D13FE5-E74F-8B22-6FD8-D5E9CE72F356}"/>
+            </a:ext>
+          </a:extLst>
+        </p:cNvPr>
+        <p:cNvGrpSpPr/>
+        <p:nvPr/>
+      </p:nvGrpSpPr>
+      <p:grpSpPr>
+        <a:xfrm>
+          <a:off x="0" y="0"/>
+          <a:ext cx="0" cy="0"/>
+          <a:chOff x="0" y="0"/>
+          <a:chExt cx="0" cy="0"/>
+        </a:xfrm>
+      </p:grpSpPr>
+      <p:sp>
+        <p:nvSpPr>
+          <p:cNvPr id="2" name="Title 1">
+            <a:extLst>
+              <a:ext uri="{FF2B5EF4-FFF2-40B4-BE49-F238E27FC236}">
+                <a16:creationId xmlns:a16="http://schemas.microsoft.com/office/drawing/2014/main" id="{C30FDB88-D3E4-2E2F-EC94-258FBFE24F22}"/>
               </a:ext>
             </a:extLst>
           </p:cNvPr>
@@ -6283,7 +7571,7 @@
             <a:spLocks noGrp="1"/>
           </p:cNvSpPr>
           <p:nvPr>
-            <p:ph idx="1"/>
+            <p:ph type="title"/>
           </p:nvPr>
         </p:nvSpPr>
         <p:spPr/>
@@ -6292,98 +7580,1114 @@
           <a:lstStyle/>
           <a:p>
             <a:r>
-              <a:rPr lang="en-US" b="1" dirty="0"/>
+              <a:rPr lang="en-US" dirty="0"/>
               <a:t>Exceptions</a:t>
             </a:r>
-            <a:r>
-              <a:rPr lang="en-US" dirty="0"/>
-              <a:t> are objects that represent serious errors</a:t>
-            </a:r>
-          </a:p>
-          <a:p>
-            <a:r>
-              <a:rPr lang="en-US" dirty="0"/>
-              <a:t>They are created with </a:t>
-            </a:r>
-            <a:r>
-              <a:rPr lang="en-US" b="1" dirty="0"/>
-              <a:t>throw</a:t>
-            </a:r>
-          </a:p>
-          <a:p>
-            <a:r>
-              <a:rPr lang="en-US" dirty="0"/>
-              <a:t>You can handle them with a </a:t>
-            </a:r>
-            <a:r>
-              <a:rPr lang="en-US" b="1" dirty="0"/>
-              <a:t>try/catch block</a:t>
-            </a:r>
-          </a:p>
-          <a:p>
-            <a:r>
-              <a:rPr lang="en-US" dirty="0"/>
-              <a:t>An </a:t>
-            </a:r>
-            <a:r>
-              <a:rPr lang="en-US" b="1" dirty="0"/>
-              <a:t>uncaught exception </a:t>
-            </a:r>
-            <a:r>
-              <a:rPr lang="en-US" dirty="0"/>
-              <a:t>propagates through all the functions on the call stack, and if none catch it it will crash the program</a:t>
-            </a:r>
-          </a:p>
-          <a:p>
-            <a:r>
-              <a:rPr lang="en-US" dirty="0"/>
-              <a:t>Object </a:t>
-            </a:r>
-            <a:r>
-              <a:rPr lang="en-US" b="1" dirty="0"/>
-              <a:t>destructors</a:t>
-            </a:r>
-            <a:r>
-              <a:rPr lang="en-US" dirty="0"/>
-              <a:t> are called correctly with exceptions</a:t>
-            </a:r>
-          </a:p>
-          <a:p>
-            <a:pPr lvl="1"/>
-            <a:r>
-              <a:rPr lang="en-US" dirty="0"/>
-              <a:t>Use </a:t>
-            </a:r>
-            <a:r>
-              <a:rPr lang="en-US" b="1" dirty="0"/>
-              <a:t>RAII</a:t>
-            </a:r>
-            <a:r>
-              <a:rPr lang="en-US" dirty="0"/>
-              <a:t> to avoid memory leaks and related errors</a:t>
-            </a:r>
-          </a:p>
-          <a:p>
-            <a:pPr lvl="1"/>
-            <a:r>
-              <a:rPr lang="en-US" dirty="0"/>
-              <a:t>Another approach is to use C++’s </a:t>
-            </a:r>
-            <a:r>
-              <a:rPr lang="en-US" b="1" dirty="0"/>
-              <a:t>smart pointers </a:t>
-            </a:r>
-            <a:r>
-              <a:rPr lang="en-US" dirty="0"/>
-              <a:t>(we won’t cover those)</a:t>
-            </a:r>
+          </a:p>
+        </p:txBody>
+      </p:sp>
+      <p:grpSp>
+        <p:nvGrpSpPr>
+          <p:cNvPr id="9" name="Group 8">
+            <a:extLst>
+              <a:ext uri="{FF2B5EF4-FFF2-40B4-BE49-F238E27FC236}">
+                <a16:creationId xmlns:a16="http://schemas.microsoft.com/office/drawing/2014/main" id="{9AA289EC-40FA-A3B1-5664-D913AA845BE9}"/>
+              </a:ext>
+            </a:extLst>
+          </p:cNvPr>
+          <p:cNvGrpSpPr/>
+          <p:nvPr/>
+        </p:nvGrpSpPr>
+        <p:grpSpPr>
+          <a:xfrm>
+            <a:off x="5199845" y="4882756"/>
+            <a:ext cx="1792309" cy="539958"/>
+            <a:chOff x="5055476" y="4635062"/>
+            <a:chExt cx="1792309" cy="539958"/>
+          </a:xfrm>
+        </p:grpSpPr>
+        <p:sp>
+          <p:nvSpPr>
+            <p:cNvPr id="6" name="TextBox 5">
+              <a:extLst>
+                <a:ext uri="{FF2B5EF4-FFF2-40B4-BE49-F238E27FC236}">
+                  <a16:creationId xmlns:a16="http://schemas.microsoft.com/office/drawing/2014/main" id="{53D0CF59-25C1-6882-B54B-CE174651FB44}"/>
+                </a:ext>
+              </a:extLst>
+            </p:cNvPr>
+            <p:cNvSpPr txBox="1"/>
+            <p:nvPr/>
+          </p:nvSpPr>
+          <p:spPr>
+            <a:xfrm>
+              <a:off x="5122954" y="4651800"/>
+              <a:ext cx="1724831" cy="523220"/>
+            </a:xfrm>
+            <a:prstGeom prst="rect">
+              <a:avLst/>
+            </a:prstGeom>
+            <a:noFill/>
+          </p:spPr>
+          <p:txBody>
+            <a:bodyPr wrap="none" rtlCol="0">
+              <a:spAutoFit/>
+            </a:bodyPr>
+            <a:lstStyle/>
+            <a:p>
+              <a:r>
+                <a:rPr lang="en-US" sz="2800" dirty="0"/>
+                <a:t>Call stack</a:t>
+              </a:r>
+            </a:p>
+          </p:txBody>
+        </p:sp>
+        <p:cxnSp>
+          <p:nvCxnSpPr>
+            <p:cNvPr id="8" name="Straight Connector 7">
+              <a:extLst>
+                <a:ext uri="{FF2B5EF4-FFF2-40B4-BE49-F238E27FC236}">
+                  <a16:creationId xmlns:a16="http://schemas.microsoft.com/office/drawing/2014/main" id="{3B5AB5BA-960E-DD43-5872-D1715A165D27}"/>
+                </a:ext>
+              </a:extLst>
+            </p:cNvPr>
+            <p:cNvCxnSpPr/>
+            <p:nvPr/>
+          </p:nvCxnSpPr>
+          <p:spPr>
+            <a:xfrm>
+              <a:off x="5055476" y="4635062"/>
+              <a:ext cx="1702676" cy="0"/>
+            </a:xfrm>
+            <a:prstGeom prst="line">
+              <a:avLst/>
+            </a:prstGeom>
+          </p:spPr>
+          <p:style>
+            <a:lnRef idx="2">
+              <a:schemeClr val="accent1"/>
+            </a:lnRef>
+            <a:fillRef idx="0">
+              <a:schemeClr val="accent1"/>
+            </a:fillRef>
+            <a:effectRef idx="1">
+              <a:schemeClr val="accent1"/>
+            </a:effectRef>
+            <a:fontRef idx="minor">
+              <a:schemeClr val="tx1"/>
+            </a:fontRef>
+          </p:style>
+        </p:cxnSp>
+      </p:grpSp>
+      <p:sp>
+        <p:nvSpPr>
+          <p:cNvPr id="10" name="TextBox 9">
+            <a:extLst>
+              <a:ext uri="{FF2B5EF4-FFF2-40B4-BE49-F238E27FC236}">
+                <a16:creationId xmlns:a16="http://schemas.microsoft.com/office/drawing/2014/main" id="{DCD4F51B-D30F-BE5A-9F7A-E1EA883B694D}"/>
+              </a:ext>
+            </a:extLst>
+          </p:cNvPr>
+          <p:cNvSpPr txBox="1"/>
+          <p:nvPr/>
+        </p:nvSpPr>
+        <p:spPr>
+          <a:xfrm>
+            <a:off x="5563611" y="4214232"/>
+            <a:ext cx="1175322" cy="523220"/>
+          </a:xfrm>
+          <a:prstGeom prst="rect">
+            <a:avLst/>
+          </a:prstGeom>
+          <a:noFill/>
+        </p:spPr>
+        <p:txBody>
+          <a:bodyPr wrap="none" rtlCol="0">
+            <a:spAutoFit/>
+          </a:bodyPr>
+          <a:lstStyle/>
+          <a:p>
+            <a:r>
+              <a:rPr lang="en-US" sz="2800" dirty="0"/>
+              <a:t>main()</a:t>
+            </a:r>
+          </a:p>
+        </p:txBody>
+      </p:sp>
+      <p:sp>
+        <p:nvSpPr>
+          <p:cNvPr id="11" name="TextBox 10">
+            <a:extLst>
+              <a:ext uri="{FF2B5EF4-FFF2-40B4-BE49-F238E27FC236}">
+                <a16:creationId xmlns:a16="http://schemas.microsoft.com/office/drawing/2014/main" id="{02C462BD-B20A-2713-FE7C-CB77066E01C5}"/>
+              </a:ext>
+            </a:extLst>
+          </p:cNvPr>
+          <p:cNvSpPr txBox="1"/>
+          <p:nvPr/>
+        </p:nvSpPr>
+        <p:spPr>
+          <a:xfrm>
+            <a:off x="5751963" y="3740796"/>
+            <a:ext cx="587020" cy="523220"/>
+          </a:xfrm>
+          <a:prstGeom prst="rect">
+            <a:avLst/>
+          </a:prstGeom>
+          <a:noFill/>
+        </p:spPr>
+        <p:txBody>
+          <a:bodyPr wrap="none" rtlCol="0">
+            <a:spAutoFit/>
+          </a:bodyPr>
+          <a:lstStyle/>
+          <a:p>
+            <a:r>
+              <a:rPr lang="en-US" sz="2800" dirty="0"/>
+              <a:t>a()</a:t>
+            </a:r>
+          </a:p>
+        </p:txBody>
+      </p:sp>
+      <p:sp>
+        <p:nvSpPr>
+          <p:cNvPr id="12" name="TextBox 11">
+            <a:extLst>
+              <a:ext uri="{FF2B5EF4-FFF2-40B4-BE49-F238E27FC236}">
+                <a16:creationId xmlns:a16="http://schemas.microsoft.com/office/drawing/2014/main" id="{E15BF426-5004-899E-68F0-6D7B79175181}"/>
+              </a:ext>
+            </a:extLst>
+          </p:cNvPr>
+          <p:cNvSpPr txBox="1"/>
+          <p:nvPr/>
+        </p:nvSpPr>
+        <p:spPr>
+          <a:xfrm>
+            <a:off x="5746353" y="3267360"/>
+            <a:ext cx="598241" cy="523220"/>
+          </a:xfrm>
+          <a:prstGeom prst="rect">
+            <a:avLst/>
+          </a:prstGeom>
+          <a:noFill/>
+        </p:spPr>
+        <p:txBody>
+          <a:bodyPr wrap="none" rtlCol="0">
+            <a:spAutoFit/>
+          </a:bodyPr>
+          <a:lstStyle/>
+          <a:p>
+            <a:r>
+              <a:rPr lang="en-US" sz="2800" dirty="0"/>
+              <a:t>b()</a:t>
+            </a:r>
+          </a:p>
+        </p:txBody>
+      </p:sp>
+      <p:sp>
+        <p:nvSpPr>
+          <p:cNvPr id="13" name="TextBox 12">
+            <a:extLst>
+              <a:ext uri="{FF2B5EF4-FFF2-40B4-BE49-F238E27FC236}">
+                <a16:creationId xmlns:a16="http://schemas.microsoft.com/office/drawing/2014/main" id="{3D2698B7-215F-63F5-7B08-824E23639477}"/>
+              </a:ext>
+            </a:extLst>
+          </p:cNvPr>
+          <p:cNvSpPr txBox="1"/>
+          <p:nvPr/>
+        </p:nvSpPr>
+        <p:spPr>
+          <a:xfrm>
+            <a:off x="5752765" y="2793924"/>
+            <a:ext cx="585417" cy="523220"/>
+          </a:xfrm>
+          <a:prstGeom prst="rect">
+            <a:avLst/>
+          </a:prstGeom>
+          <a:noFill/>
+        </p:spPr>
+        <p:txBody>
+          <a:bodyPr wrap="none" rtlCol="0">
+            <a:spAutoFit/>
+          </a:bodyPr>
+          <a:lstStyle/>
+          <a:p>
+            <a:r>
+              <a:rPr lang="en-US" sz="2800" dirty="0"/>
+              <a:t>c()</a:t>
+            </a:r>
+          </a:p>
+        </p:txBody>
+      </p:sp>
+      <p:sp>
+        <p:nvSpPr>
+          <p:cNvPr id="14" name="TextBox 13">
+            <a:extLst>
+              <a:ext uri="{FF2B5EF4-FFF2-40B4-BE49-F238E27FC236}">
+                <a16:creationId xmlns:a16="http://schemas.microsoft.com/office/drawing/2014/main" id="{C9679E37-F8F5-0A13-8757-331DB9898ECF}"/>
+              </a:ext>
+            </a:extLst>
+          </p:cNvPr>
+          <p:cNvSpPr txBox="1"/>
+          <p:nvPr/>
+        </p:nvSpPr>
+        <p:spPr>
+          <a:xfrm>
+            <a:off x="5746353" y="2320488"/>
+            <a:ext cx="598241" cy="523220"/>
+          </a:xfrm>
+          <a:prstGeom prst="rect">
+            <a:avLst/>
+          </a:prstGeom>
+          <a:noFill/>
+        </p:spPr>
+        <p:txBody>
+          <a:bodyPr wrap="none" rtlCol="0">
+            <a:spAutoFit/>
+          </a:bodyPr>
+          <a:lstStyle/>
+          <a:p>
+            <a:r>
+              <a:rPr lang="en-US" sz="2800" dirty="0"/>
+              <a:t>d()</a:t>
+            </a:r>
+          </a:p>
+        </p:txBody>
+      </p:sp>
+      <p:sp>
+        <p:nvSpPr>
+          <p:cNvPr id="15" name="TextBox 14">
+            <a:extLst>
+              <a:ext uri="{FF2B5EF4-FFF2-40B4-BE49-F238E27FC236}">
+                <a16:creationId xmlns:a16="http://schemas.microsoft.com/office/drawing/2014/main" id="{5D6AD5F1-8A22-8A81-2EA7-B24424BCDB26}"/>
+              </a:ext>
+            </a:extLst>
+          </p:cNvPr>
+          <p:cNvSpPr txBox="1"/>
+          <p:nvPr/>
+        </p:nvSpPr>
+        <p:spPr>
+          <a:xfrm>
+            <a:off x="2543903" y="1690688"/>
+            <a:ext cx="2575034" cy="1200329"/>
+          </a:xfrm>
+          <a:prstGeom prst="rect">
+            <a:avLst/>
+          </a:prstGeom>
+          <a:solidFill>
+            <a:schemeClr val="accent3">
+              <a:lumMod val="20000"/>
+              <a:lumOff val="80000"/>
+            </a:schemeClr>
+          </a:solidFill>
+        </p:spPr>
+        <p:txBody>
+          <a:bodyPr wrap="square" rtlCol="0">
+            <a:spAutoFit/>
+          </a:bodyPr>
+          <a:lstStyle/>
+          <a:p>
+            <a:pPr algn="ctr"/>
+            <a:r>
+              <a:rPr lang="en-US" dirty="0">
+                <a:cs typeface="Consolas" panose="020B0609020204030204" pitchFamily="49" charset="0"/>
+              </a:rPr>
+              <a:t>Suppose function </a:t>
+            </a:r>
+            <a:r>
+              <a:rPr lang="en-US" dirty="0">
+                <a:latin typeface="Consolas" panose="020B0609020204030204" pitchFamily="49" charset="0"/>
+                <a:cs typeface="Consolas" panose="020B0609020204030204" pitchFamily="49" charset="0"/>
+              </a:rPr>
+              <a:t>d() </a:t>
+            </a:r>
+            <a:r>
+              <a:rPr lang="en-US" dirty="0">
+                <a:cs typeface="Consolas" panose="020B0609020204030204" pitchFamily="49" charset="0"/>
+              </a:rPr>
+              <a:t>throws an exception when the stack looks like this …</a:t>
+            </a:r>
+          </a:p>
+        </p:txBody>
+      </p:sp>
+      <p:cxnSp>
+        <p:nvCxnSpPr>
+          <p:cNvPr id="17" name="Straight Arrow Connector 16">
+            <a:extLst>
+              <a:ext uri="{FF2B5EF4-FFF2-40B4-BE49-F238E27FC236}">
+                <a16:creationId xmlns:a16="http://schemas.microsoft.com/office/drawing/2014/main" id="{42C750E2-A7A3-BC23-1988-C6D232ADD3E8}"/>
+              </a:ext>
+            </a:extLst>
+          </p:cNvPr>
+          <p:cNvCxnSpPr>
+            <a:stCxn id="15" idx="3"/>
+            <a:endCxn id="14" idx="1"/>
+          </p:cNvCxnSpPr>
+          <p:nvPr/>
+        </p:nvCxnSpPr>
+        <p:spPr>
+          <a:xfrm>
+            <a:off x="5118937" y="2290853"/>
+            <a:ext cx="627416" cy="291245"/>
+          </a:xfrm>
+          <a:prstGeom prst="straightConnector1">
+            <a:avLst/>
+          </a:prstGeom>
+          <a:ln>
+            <a:tailEnd type="triangle"/>
+          </a:ln>
+        </p:spPr>
+        <p:style>
+          <a:lnRef idx="2">
+            <a:schemeClr val="accent1"/>
+          </a:lnRef>
+          <a:fillRef idx="0">
+            <a:schemeClr val="accent1"/>
+          </a:fillRef>
+          <a:effectRef idx="1">
+            <a:schemeClr val="accent1"/>
+          </a:effectRef>
+          <a:fontRef idx="minor">
+            <a:schemeClr val="tx1"/>
+          </a:fontRef>
+        </p:style>
+      </p:cxnSp>
+      <p:sp>
+        <p:nvSpPr>
+          <p:cNvPr id="18" name="TextBox 17">
+            <a:extLst>
+              <a:ext uri="{FF2B5EF4-FFF2-40B4-BE49-F238E27FC236}">
+                <a16:creationId xmlns:a16="http://schemas.microsoft.com/office/drawing/2014/main" id="{6FC9A874-BEB9-268A-2B46-84A1C648C597}"/>
+              </a:ext>
+            </a:extLst>
+          </p:cNvPr>
+          <p:cNvSpPr txBox="1"/>
+          <p:nvPr/>
+        </p:nvSpPr>
+        <p:spPr>
+          <a:xfrm>
+            <a:off x="7312332" y="2402570"/>
+            <a:ext cx="3252553" cy="1200329"/>
+          </a:xfrm>
+          <a:prstGeom prst="rect">
+            <a:avLst/>
+          </a:prstGeom>
+          <a:solidFill>
+            <a:schemeClr val="accent3">
+              <a:lumMod val="20000"/>
+              <a:lumOff val="80000"/>
+            </a:schemeClr>
+          </a:solidFill>
+        </p:spPr>
+        <p:txBody>
+          <a:bodyPr wrap="square" rtlCol="0">
+            <a:spAutoFit/>
+          </a:bodyPr>
+          <a:lstStyle/>
+          <a:p>
+            <a:pPr algn="ctr"/>
+            <a:r>
+              <a:rPr lang="en-US" dirty="0">
+                <a:cs typeface="Consolas" panose="020B0609020204030204" pitchFamily="49" charset="0"/>
+              </a:rPr>
+              <a:t>But if the exception is not caught in </a:t>
+            </a:r>
+            <a:r>
+              <a:rPr lang="en-US" dirty="0">
+                <a:latin typeface="Consolas" panose="020B0609020204030204" pitchFamily="49" charset="0"/>
+                <a:cs typeface="Consolas" panose="020B0609020204030204" pitchFamily="49" charset="0"/>
+              </a:rPr>
+              <a:t>d()</a:t>
+            </a:r>
+            <a:r>
+              <a:rPr lang="en-US" dirty="0">
+                <a:cs typeface="Consolas" panose="020B0609020204030204" pitchFamily="49" charset="0"/>
+              </a:rPr>
+              <a:t>, it propagates to </a:t>
+            </a:r>
+            <a:r>
+              <a:rPr lang="en-US" dirty="0">
+                <a:latin typeface="Consolas" panose="020B0609020204030204" pitchFamily="49" charset="0"/>
+                <a:cs typeface="Consolas" panose="020B0609020204030204" pitchFamily="49" charset="0"/>
+              </a:rPr>
+              <a:t>c()</a:t>
+            </a:r>
+            <a:r>
+              <a:rPr lang="en-US" dirty="0">
+                <a:cs typeface="Consolas" panose="020B0609020204030204" pitchFamily="49" charset="0"/>
+              </a:rPr>
+              <a:t>. Any destructors in </a:t>
+            </a:r>
+            <a:r>
+              <a:rPr lang="en-US" dirty="0">
+                <a:latin typeface="Consolas" panose="020B0609020204030204" pitchFamily="49" charset="0"/>
+                <a:cs typeface="Consolas" panose="020B0609020204030204" pitchFamily="49" charset="0"/>
+              </a:rPr>
+              <a:t>d()</a:t>
+            </a:r>
+            <a:r>
+              <a:rPr lang="en-US" dirty="0">
+                <a:cs typeface="Consolas" panose="020B0609020204030204" pitchFamily="49" charset="0"/>
+              </a:rPr>
+              <a:t> are correctly called.</a:t>
+            </a:r>
+          </a:p>
+        </p:txBody>
+      </p:sp>
+      <p:sp>
+        <p:nvSpPr>
+          <p:cNvPr id="3" name="Freeform 2">
+            <a:extLst>
+              <a:ext uri="{FF2B5EF4-FFF2-40B4-BE49-F238E27FC236}">
+                <a16:creationId xmlns:a16="http://schemas.microsoft.com/office/drawing/2014/main" id="{3F93B91E-E18A-83DF-81F7-C1BAAE61D9B4}"/>
+              </a:ext>
+            </a:extLst>
+          </p:cNvPr>
+          <p:cNvSpPr/>
+          <p:nvPr/>
+        </p:nvSpPr>
+        <p:spPr>
+          <a:xfrm>
+            <a:off x="6411310" y="2638097"/>
+            <a:ext cx="483485" cy="462455"/>
+          </a:xfrm>
+          <a:custGeom>
+            <a:avLst/>
+            <a:gdLst>
+              <a:gd name="csX0" fmla="*/ 10511 w 483485"/>
+              <a:gd name="csY0" fmla="*/ 0 h 462455"/>
+              <a:gd name="csX1" fmla="*/ 483476 w 483485"/>
+              <a:gd name="csY1" fmla="*/ 304800 h 462455"/>
+              <a:gd name="csX2" fmla="*/ 0 w 483485"/>
+              <a:gd name="csY2" fmla="*/ 462455 h 462455"/>
+            </a:gdLst>
+            <a:ahLst/>
+            <a:cxnLst>
+              <a:cxn ang="0">
+                <a:pos x="csX0" y="csY0"/>
+              </a:cxn>
+              <a:cxn ang="0">
+                <a:pos x="csX1" y="csY1"/>
+              </a:cxn>
+              <a:cxn ang="0">
+                <a:pos x="csX2" y="csY2"/>
+              </a:cxn>
+            </a:cxnLst>
+            <a:rect l="l" t="t" r="r" b="b"/>
+            <a:pathLst>
+              <a:path w="483485" h="462455">
+                <a:moveTo>
+                  <a:pt x="10511" y="0"/>
+                </a:moveTo>
+                <a:cubicBezTo>
+                  <a:pt x="247869" y="113862"/>
+                  <a:pt x="485228" y="227724"/>
+                  <a:pt x="483476" y="304800"/>
+                </a:cubicBezTo>
+                <a:cubicBezTo>
+                  <a:pt x="481724" y="381876"/>
+                  <a:pt x="240862" y="422165"/>
+                  <a:pt x="0" y="462455"/>
+                </a:cubicBezTo>
+              </a:path>
+            </a:pathLst>
+          </a:custGeom>
+          <a:noFill/>
+          <a:ln>
+            <a:solidFill>
+              <a:schemeClr val="accent1"/>
+            </a:solidFill>
+            <a:tailEnd type="triangle"/>
+          </a:ln>
+        </p:spPr>
+        <p:style>
+          <a:lnRef idx="2">
+            <a:schemeClr val="accent1">
+              <a:shade val="15000"/>
+            </a:schemeClr>
+          </a:lnRef>
+          <a:fillRef idx="1">
+            <a:schemeClr val="accent1"/>
+          </a:fillRef>
+          <a:effectRef idx="0">
+            <a:schemeClr val="accent1"/>
+          </a:effectRef>
+          <a:fontRef idx="minor">
+            <a:schemeClr val="lt1"/>
+          </a:fontRef>
+        </p:style>
+        <p:txBody>
+          <a:bodyPr rtlCol="0" anchor="ctr"/>
+          <a:lstStyle/>
+          <a:p>
+            <a:pPr algn="ctr"/>
+            <a:endParaRPr lang="en-US"/>
           </a:p>
         </p:txBody>
       </p:sp>
     </p:spTree>
     <p:extLst>
       <p:ext uri="{BB962C8B-B14F-4D97-AF65-F5344CB8AC3E}">
-        <p14:creationId xmlns:p14="http://schemas.microsoft.com/office/powerpoint/2010/main" val="902908186"/>
+        <p14:creationId xmlns:p14="http://schemas.microsoft.com/office/powerpoint/2010/main" val="493803107"/>
+      </p:ext>
+    </p:extLst>
+  </p:cSld>
+  <p:clrMapOvr>
+    <a:masterClrMapping/>
+  </p:clrMapOvr>
+</p:sld>
+</file>
+
+<file path=ppt/slides/slide19.xml><?xml version="1.0" encoding="utf-8"?>
+<p:sld xmlns:a="http://schemas.openxmlformats.org/drawingml/2006/main" xmlns:r="http://schemas.openxmlformats.org/officeDocument/2006/relationships" xmlns:p="http://schemas.openxmlformats.org/presentationml/2006/main">
+  <p:cSld>
+    <p:spTree>
+      <p:nvGrpSpPr>
+        <p:cNvPr id="1" name="">
+          <a:extLst>
+            <a:ext uri="{FF2B5EF4-FFF2-40B4-BE49-F238E27FC236}">
+              <a16:creationId xmlns:a16="http://schemas.microsoft.com/office/drawing/2014/main" id="{6874219A-8B3A-BE60-381A-6E7E8600E001}"/>
+            </a:ext>
+          </a:extLst>
+        </p:cNvPr>
+        <p:cNvGrpSpPr/>
+        <p:nvPr/>
+      </p:nvGrpSpPr>
+      <p:grpSpPr>
+        <a:xfrm>
+          <a:off x="0" y="0"/>
+          <a:ext cx="0" cy="0"/>
+          <a:chOff x="0" y="0"/>
+          <a:chExt cx="0" cy="0"/>
+        </a:xfrm>
+      </p:grpSpPr>
+      <p:sp>
+        <p:nvSpPr>
+          <p:cNvPr id="2" name="Title 1">
+            <a:extLst>
+              <a:ext uri="{FF2B5EF4-FFF2-40B4-BE49-F238E27FC236}">
+                <a16:creationId xmlns:a16="http://schemas.microsoft.com/office/drawing/2014/main" id="{6AFAAA3C-734E-50B5-C429-ABBD713EC863}"/>
+              </a:ext>
+            </a:extLst>
+          </p:cNvPr>
+          <p:cNvSpPr>
+            <a:spLocks noGrp="1"/>
+          </p:cNvSpPr>
+          <p:nvPr>
+            <p:ph type="title"/>
+          </p:nvPr>
+        </p:nvSpPr>
+        <p:spPr/>
+        <p:txBody>
+          <a:bodyPr/>
+          <a:lstStyle/>
+          <a:p>
+            <a:r>
+              <a:rPr lang="en-US" dirty="0"/>
+              <a:t>Exceptions</a:t>
+            </a:r>
+          </a:p>
+        </p:txBody>
+      </p:sp>
+      <p:grpSp>
+        <p:nvGrpSpPr>
+          <p:cNvPr id="9" name="Group 8">
+            <a:extLst>
+              <a:ext uri="{FF2B5EF4-FFF2-40B4-BE49-F238E27FC236}">
+                <a16:creationId xmlns:a16="http://schemas.microsoft.com/office/drawing/2014/main" id="{FFF4EBEC-F57F-C5B9-D195-E33B154BA55C}"/>
+              </a:ext>
+            </a:extLst>
+          </p:cNvPr>
+          <p:cNvGrpSpPr/>
+          <p:nvPr/>
+        </p:nvGrpSpPr>
+        <p:grpSpPr>
+          <a:xfrm>
+            <a:off x="5199845" y="4882756"/>
+            <a:ext cx="1792309" cy="539958"/>
+            <a:chOff x="5055476" y="4635062"/>
+            <a:chExt cx="1792309" cy="539958"/>
+          </a:xfrm>
+        </p:grpSpPr>
+        <p:sp>
+          <p:nvSpPr>
+            <p:cNvPr id="6" name="TextBox 5">
+              <a:extLst>
+                <a:ext uri="{FF2B5EF4-FFF2-40B4-BE49-F238E27FC236}">
+                  <a16:creationId xmlns:a16="http://schemas.microsoft.com/office/drawing/2014/main" id="{6AFCD346-F837-9AA9-9D11-4967C97C3EDC}"/>
+                </a:ext>
+              </a:extLst>
+            </p:cNvPr>
+            <p:cNvSpPr txBox="1"/>
+            <p:nvPr/>
+          </p:nvSpPr>
+          <p:spPr>
+            <a:xfrm>
+              <a:off x="5122954" y="4651800"/>
+              <a:ext cx="1724831" cy="523220"/>
+            </a:xfrm>
+            <a:prstGeom prst="rect">
+              <a:avLst/>
+            </a:prstGeom>
+            <a:noFill/>
+          </p:spPr>
+          <p:txBody>
+            <a:bodyPr wrap="none" rtlCol="0">
+              <a:spAutoFit/>
+            </a:bodyPr>
+            <a:lstStyle/>
+            <a:p>
+              <a:r>
+                <a:rPr lang="en-US" sz="2800" dirty="0"/>
+                <a:t>Call stack</a:t>
+              </a:r>
+            </a:p>
+          </p:txBody>
+        </p:sp>
+        <p:cxnSp>
+          <p:nvCxnSpPr>
+            <p:cNvPr id="8" name="Straight Connector 7">
+              <a:extLst>
+                <a:ext uri="{FF2B5EF4-FFF2-40B4-BE49-F238E27FC236}">
+                  <a16:creationId xmlns:a16="http://schemas.microsoft.com/office/drawing/2014/main" id="{59AFD20C-28BA-E062-0E0F-B581B48A008E}"/>
+                </a:ext>
+              </a:extLst>
+            </p:cNvPr>
+            <p:cNvCxnSpPr/>
+            <p:nvPr/>
+          </p:nvCxnSpPr>
+          <p:spPr>
+            <a:xfrm>
+              <a:off x="5055476" y="4635062"/>
+              <a:ext cx="1702676" cy="0"/>
+            </a:xfrm>
+            <a:prstGeom prst="line">
+              <a:avLst/>
+            </a:prstGeom>
+          </p:spPr>
+          <p:style>
+            <a:lnRef idx="2">
+              <a:schemeClr val="accent1"/>
+            </a:lnRef>
+            <a:fillRef idx="0">
+              <a:schemeClr val="accent1"/>
+            </a:fillRef>
+            <a:effectRef idx="1">
+              <a:schemeClr val="accent1"/>
+            </a:effectRef>
+            <a:fontRef idx="minor">
+              <a:schemeClr val="tx1"/>
+            </a:fontRef>
+          </p:style>
+        </p:cxnSp>
+      </p:grpSp>
+      <p:sp>
+        <p:nvSpPr>
+          <p:cNvPr id="10" name="TextBox 9">
+            <a:extLst>
+              <a:ext uri="{FF2B5EF4-FFF2-40B4-BE49-F238E27FC236}">
+                <a16:creationId xmlns:a16="http://schemas.microsoft.com/office/drawing/2014/main" id="{86922894-8F9D-5A52-76EA-31CB3DF3AE35}"/>
+              </a:ext>
+            </a:extLst>
+          </p:cNvPr>
+          <p:cNvSpPr txBox="1"/>
+          <p:nvPr/>
+        </p:nvSpPr>
+        <p:spPr>
+          <a:xfrm>
+            <a:off x="5563611" y="4214232"/>
+            <a:ext cx="1175322" cy="523220"/>
+          </a:xfrm>
+          <a:prstGeom prst="rect">
+            <a:avLst/>
+          </a:prstGeom>
+          <a:noFill/>
+        </p:spPr>
+        <p:txBody>
+          <a:bodyPr wrap="none" rtlCol="0">
+            <a:spAutoFit/>
+          </a:bodyPr>
+          <a:lstStyle/>
+          <a:p>
+            <a:r>
+              <a:rPr lang="en-US" sz="2800" dirty="0"/>
+              <a:t>main()</a:t>
+            </a:r>
+          </a:p>
+        </p:txBody>
+      </p:sp>
+      <p:sp>
+        <p:nvSpPr>
+          <p:cNvPr id="11" name="TextBox 10">
+            <a:extLst>
+              <a:ext uri="{FF2B5EF4-FFF2-40B4-BE49-F238E27FC236}">
+                <a16:creationId xmlns:a16="http://schemas.microsoft.com/office/drawing/2014/main" id="{6E3F62D7-D1FA-9F58-40A6-0F6662222F67}"/>
+              </a:ext>
+            </a:extLst>
+          </p:cNvPr>
+          <p:cNvSpPr txBox="1"/>
+          <p:nvPr/>
+        </p:nvSpPr>
+        <p:spPr>
+          <a:xfrm>
+            <a:off x="5751963" y="3740796"/>
+            <a:ext cx="587020" cy="523220"/>
+          </a:xfrm>
+          <a:prstGeom prst="rect">
+            <a:avLst/>
+          </a:prstGeom>
+          <a:noFill/>
+        </p:spPr>
+        <p:txBody>
+          <a:bodyPr wrap="none" rtlCol="0">
+            <a:spAutoFit/>
+          </a:bodyPr>
+          <a:lstStyle/>
+          <a:p>
+            <a:r>
+              <a:rPr lang="en-US" sz="2800" dirty="0"/>
+              <a:t>a()</a:t>
+            </a:r>
+          </a:p>
+        </p:txBody>
+      </p:sp>
+      <p:sp>
+        <p:nvSpPr>
+          <p:cNvPr id="12" name="TextBox 11">
+            <a:extLst>
+              <a:ext uri="{FF2B5EF4-FFF2-40B4-BE49-F238E27FC236}">
+                <a16:creationId xmlns:a16="http://schemas.microsoft.com/office/drawing/2014/main" id="{0D186DA0-2890-A343-1285-869F3248F41C}"/>
+              </a:ext>
+            </a:extLst>
+          </p:cNvPr>
+          <p:cNvSpPr txBox="1"/>
+          <p:nvPr/>
+        </p:nvSpPr>
+        <p:spPr>
+          <a:xfrm>
+            <a:off x="5746353" y="3267360"/>
+            <a:ext cx="598241" cy="523220"/>
+          </a:xfrm>
+          <a:prstGeom prst="rect">
+            <a:avLst/>
+          </a:prstGeom>
+          <a:noFill/>
+        </p:spPr>
+        <p:txBody>
+          <a:bodyPr wrap="none" rtlCol="0">
+            <a:spAutoFit/>
+          </a:bodyPr>
+          <a:lstStyle/>
+          <a:p>
+            <a:r>
+              <a:rPr lang="en-US" sz="2800" dirty="0"/>
+              <a:t>b()</a:t>
+            </a:r>
+          </a:p>
+        </p:txBody>
+      </p:sp>
+      <p:sp>
+        <p:nvSpPr>
+          <p:cNvPr id="13" name="TextBox 12">
+            <a:extLst>
+              <a:ext uri="{FF2B5EF4-FFF2-40B4-BE49-F238E27FC236}">
+                <a16:creationId xmlns:a16="http://schemas.microsoft.com/office/drawing/2014/main" id="{07FEF193-D7EF-8409-24A4-B0F0ED9F5905}"/>
+              </a:ext>
+            </a:extLst>
+          </p:cNvPr>
+          <p:cNvSpPr txBox="1"/>
+          <p:nvPr/>
+        </p:nvSpPr>
+        <p:spPr>
+          <a:xfrm>
+            <a:off x="5752765" y="2793924"/>
+            <a:ext cx="585417" cy="523220"/>
+          </a:xfrm>
+          <a:prstGeom prst="rect">
+            <a:avLst/>
+          </a:prstGeom>
+          <a:noFill/>
+        </p:spPr>
+        <p:txBody>
+          <a:bodyPr wrap="none" rtlCol="0">
+            <a:spAutoFit/>
+          </a:bodyPr>
+          <a:lstStyle/>
+          <a:p>
+            <a:r>
+              <a:rPr lang="en-US" sz="2800" dirty="0"/>
+              <a:t>c()</a:t>
+            </a:r>
+          </a:p>
+        </p:txBody>
+      </p:sp>
+      <p:sp>
+        <p:nvSpPr>
+          <p:cNvPr id="14" name="TextBox 13">
+            <a:extLst>
+              <a:ext uri="{FF2B5EF4-FFF2-40B4-BE49-F238E27FC236}">
+                <a16:creationId xmlns:a16="http://schemas.microsoft.com/office/drawing/2014/main" id="{93B3FC06-D16A-720A-2307-9EA8D8C5E942}"/>
+              </a:ext>
+            </a:extLst>
+          </p:cNvPr>
+          <p:cNvSpPr txBox="1"/>
+          <p:nvPr/>
+        </p:nvSpPr>
+        <p:spPr>
+          <a:xfrm>
+            <a:off x="5746353" y="2320488"/>
+            <a:ext cx="598241" cy="523220"/>
+          </a:xfrm>
+          <a:prstGeom prst="rect">
+            <a:avLst/>
+          </a:prstGeom>
+          <a:noFill/>
+        </p:spPr>
+        <p:txBody>
+          <a:bodyPr wrap="none" rtlCol="0">
+            <a:spAutoFit/>
+          </a:bodyPr>
+          <a:lstStyle/>
+          <a:p>
+            <a:r>
+              <a:rPr lang="en-US" sz="2800" dirty="0"/>
+              <a:t>d()</a:t>
+            </a:r>
+          </a:p>
+        </p:txBody>
+      </p:sp>
+      <p:sp>
+        <p:nvSpPr>
+          <p:cNvPr id="18" name="TextBox 17">
+            <a:extLst>
+              <a:ext uri="{FF2B5EF4-FFF2-40B4-BE49-F238E27FC236}">
+                <a16:creationId xmlns:a16="http://schemas.microsoft.com/office/drawing/2014/main" id="{95721E0A-D535-B634-D127-D4FD27A340C0}"/>
+              </a:ext>
+            </a:extLst>
+          </p:cNvPr>
+          <p:cNvSpPr txBox="1"/>
+          <p:nvPr/>
+        </p:nvSpPr>
+        <p:spPr>
+          <a:xfrm>
+            <a:off x="7280801" y="2605640"/>
+            <a:ext cx="3252553" cy="923330"/>
+          </a:xfrm>
+          <a:prstGeom prst="rect">
+            <a:avLst/>
+          </a:prstGeom>
+          <a:solidFill>
+            <a:schemeClr val="accent3">
+              <a:lumMod val="20000"/>
+              <a:lumOff val="80000"/>
+            </a:schemeClr>
+          </a:solidFill>
+        </p:spPr>
+        <p:txBody>
+          <a:bodyPr wrap="square" rtlCol="0">
+            <a:spAutoFit/>
+          </a:bodyPr>
+          <a:lstStyle/>
+          <a:p>
+            <a:pPr algn="ctr"/>
+            <a:r>
+              <a:rPr lang="en-US" dirty="0">
+                <a:cs typeface="Consolas" panose="020B0609020204030204" pitchFamily="49" charset="0"/>
+              </a:rPr>
+              <a:t>After the exception leaves </a:t>
+            </a:r>
+            <a:r>
+              <a:rPr lang="en-US" dirty="0">
+                <a:latin typeface="Consolas" panose="020B0609020204030204" pitchFamily="49" charset="0"/>
+                <a:cs typeface="Consolas" panose="020B0609020204030204" pitchFamily="49" charset="0"/>
+              </a:rPr>
+              <a:t>d()</a:t>
+            </a:r>
+            <a:r>
+              <a:rPr lang="en-US" dirty="0">
+                <a:cs typeface="Consolas" panose="020B0609020204030204" pitchFamily="49" charset="0"/>
+              </a:rPr>
+              <a:t>, </a:t>
+            </a:r>
+            <a:r>
+              <a:rPr lang="en-US" dirty="0">
+                <a:latin typeface="Consolas" panose="020B0609020204030204" pitchFamily="49" charset="0"/>
+                <a:cs typeface="Consolas" panose="020B0609020204030204" pitchFamily="49" charset="0"/>
+              </a:rPr>
+              <a:t>d()</a:t>
+            </a:r>
+            <a:r>
+              <a:rPr lang="en-US" dirty="0">
+                <a:cs typeface="Consolas" panose="020B0609020204030204" pitchFamily="49" charset="0"/>
+              </a:rPr>
+              <a:t> is pop from the stack and </a:t>
+            </a:r>
+            <a:r>
+              <a:rPr lang="en-US" dirty="0">
+                <a:latin typeface="Consolas" panose="020B0609020204030204" pitchFamily="49" charset="0"/>
+                <a:cs typeface="Consolas" panose="020B0609020204030204" pitchFamily="49" charset="0"/>
+              </a:rPr>
+              <a:t>c()</a:t>
+            </a:r>
+            <a:r>
+              <a:rPr lang="en-US" dirty="0">
+                <a:cs typeface="Consolas" panose="020B0609020204030204" pitchFamily="49" charset="0"/>
+              </a:rPr>
+              <a:t> has the chance to catch it.</a:t>
+            </a:r>
+          </a:p>
+        </p:txBody>
+      </p:sp>
+      <p:grpSp>
+        <p:nvGrpSpPr>
+          <p:cNvPr id="21" name="Group 20">
+            <a:extLst>
+              <a:ext uri="{FF2B5EF4-FFF2-40B4-BE49-F238E27FC236}">
+                <a16:creationId xmlns:a16="http://schemas.microsoft.com/office/drawing/2014/main" id="{D257EF72-815C-953C-D423-8004E28F1B82}"/>
+              </a:ext>
+            </a:extLst>
+          </p:cNvPr>
+          <p:cNvGrpSpPr/>
+          <p:nvPr/>
+        </p:nvGrpSpPr>
+        <p:grpSpPr>
+          <a:xfrm>
+            <a:off x="5563611" y="2439320"/>
+            <a:ext cx="903890" cy="281952"/>
+            <a:chOff x="2385848" y="2511972"/>
+            <a:chExt cx="903890" cy="281952"/>
+          </a:xfrm>
+        </p:grpSpPr>
+        <p:cxnSp>
+          <p:nvCxnSpPr>
+            <p:cNvPr id="5" name="Straight Connector 4">
+              <a:extLst>
+                <a:ext uri="{FF2B5EF4-FFF2-40B4-BE49-F238E27FC236}">
+                  <a16:creationId xmlns:a16="http://schemas.microsoft.com/office/drawing/2014/main" id="{B5DFF8A8-15D2-DE2A-8B6F-ABA836C6DF35}"/>
+                </a:ext>
+              </a:extLst>
+            </p:cNvPr>
+            <p:cNvCxnSpPr/>
+            <p:nvPr/>
+          </p:nvCxnSpPr>
+          <p:spPr>
+            <a:xfrm flipV="1">
+              <a:off x="2385848" y="2511972"/>
+              <a:ext cx="903890" cy="281952"/>
+            </a:xfrm>
+            <a:prstGeom prst="line">
+              <a:avLst/>
+            </a:prstGeom>
+            <a:ln>
+              <a:solidFill>
+                <a:srgbClr val="FF0000"/>
+              </a:solidFill>
+            </a:ln>
+          </p:spPr>
+          <p:style>
+            <a:lnRef idx="2">
+              <a:schemeClr val="accent1"/>
+            </a:lnRef>
+            <a:fillRef idx="0">
+              <a:schemeClr val="accent1"/>
+            </a:fillRef>
+            <a:effectRef idx="1">
+              <a:schemeClr val="accent1"/>
+            </a:effectRef>
+            <a:fontRef idx="minor">
+              <a:schemeClr val="tx1"/>
+            </a:fontRef>
+          </p:style>
+        </p:cxnSp>
+        <p:cxnSp>
+          <p:nvCxnSpPr>
+            <p:cNvPr id="7" name="Straight Connector 6">
+              <a:extLst>
+                <a:ext uri="{FF2B5EF4-FFF2-40B4-BE49-F238E27FC236}">
+                  <a16:creationId xmlns:a16="http://schemas.microsoft.com/office/drawing/2014/main" id="{FC6BD7C3-1E0D-A1C6-6E8A-8A7963D0CFF1}"/>
+                </a:ext>
+              </a:extLst>
+            </p:cNvPr>
+            <p:cNvCxnSpPr>
+              <a:cxnSpLocks/>
+            </p:cNvCxnSpPr>
+            <p:nvPr/>
+          </p:nvCxnSpPr>
+          <p:spPr>
+            <a:xfrm>
+              <a:off x="2385848" y="2511972"/>
+              <a:ext cx="903890" cy="281952"/>
+            </a:xfrm>
+            <a:prstGeom prst="line">
+              <a:avLst/>
+            </a:prstGeom>
+            <a:ln>
+              <a:solidFill>
+                <a:srgbClr val="FF0000"/>
+              </a:solidFill>
+            </a:ln>
+          </p:spPr>
+          <p:style>
+            <a:lnRef idx="2">
+              <a:schemeClr val="accent1"/>
+            </a:lnRef>
+            <a:fillRef idx="0">
+              <a:schemeClr val="accent1"/>
+            </a:fillRef>
+            <a:effectRef idx="1">
+              <a:schemeClr val="accent1"/>
+            </a:effectRef>
+            <a:fontRef idx="minor">
+              <a:schemeClr val="tx1"/>
+            </a:fontRef>
+          </p:style>
+        </p:cxnSp>
+      </p:grpSp>
+      <p:cxnSp>
+        <p:nvCxnSpPr>
+          <p:cNvPr id="23" name="Straight Arrow Connector 22">
+            <a:extLst>
+              <a:ext uri="{FF2B5EF4-FFF2-40B4-BE49-F238E27FC236}">
+                <a16:creationId xmlns:a16="http://schemas.microsoft.com/office/drawing/2014/main" id="{CE201D48-21CA-59D0-6B98-8D858EE9CF85}"/>
+              </a:ext>
+            </a:extLst>
+          </p:cNvPr>
+          <p:cNvCxnSpPr>
+            <a:stCxn id="18" idx="1"/>
+            <a:endCxn id="13" idx="3"/>
+          </p:cNvCxnSpPr>
+          <p:nvPr/>
+        </p:nvCxnSpPr>
+        <p:spPr>
+          <a:xfrm flipH="1" flipV="1">
+            <a:off x="6338182" y="3055534"/>
+            <a:ext cx="942619" cy="11771"/>
+          </a:xfrm>
+          <a:prstGeom prst="straightConnector1">
+            <a:avLst/>
+          </a:prstGeom>
+          <a:ln>
+            <a:tailEnd type="triangle"/>
+          </a:ln>
+        </p:spPr>
+        <p:style>
+          <a:lnRef idx="2">
+            <a:schemeClr val="accent1"/>
+          </a:lnRef>
+          <a:fillRef idx="0">
+            <a:schemeClr val="accent1"/>
+          </a:fillRef>
+          <a:effectRef idx="1">
+            <a:schemeClr val="accent1"/>
+          </a:effectRef>
+          <a:fontRef idx="minor">
+            <a:schemeClr val="tx1"/>
+          </a:fontRef>
+        </p:style>
+      </p:cxnSp>
+    </p:spTree>
+    <p:extLst>
+      <p:ext uri="{BB962C8B-B14F-4D97-AF65-F5344CB8AC3E}">
+        <p14:creationId xmlns:p14="http://schemas.microsoft.com/office/powerpoint/2010/main" val="1825712921"/>
       </p:ext>
     </p:extLst>
   </p:cSld>
@@ -6489,6 +8793,1069 @@
     <p:extLst>
       <p:ext uri="{BB962C8B-B14F-4D97-AF65-F5344CB8AC3E}">
         <p14:creationId xmlns:p14="http://schemas.microsoft.com/office/powerpoint/2010/main" val="2472228800"/>
+      </p:ext>
+    </p:extLst>
+  </p:cSld>
+  <p:clrMapOvr>
+    <a:masterClrMapping/>
+  </p:clrMapOvr>
+</p:sld>
+</file>
+
+<file path=ppt/slides/slide20.xml><?xml version="1.0" encoding="utf-8"?>
+<p:sld xmlns:a="http://schemas.openxmlformats.org/drawingml/2006/main" xmlns:r="http://schemas.openxmlformats.org/officeDocument/2006/relationships" xmlns:p="http://schemas.openxmlformats.org/presentationml/2006/main">
+  <p:cSld>
+    <p:spTree>
+      <p:nvGrpSpPr>
+        <p:cNvPr id="1" name="">
+          <a:extLst>
+            <a:ext uri="{FF2B5EF4-FFF2-40B4-BE49-F238E27FC236}">
+              <a16:creationId xmlns:a16="http://schemas.microsoft.com/office/drawing/2014/main" id="{E3796206-0D86-E872-ECFA-FAC153C20E38}"/>
+            </a:ext>
+          </a:extLst>
+        </p:cNvPr>
+        <p:cNvGrpSpPr/>
+        <p:nvPr/>
+      </p:nvGrpSpPr>
+      <p:grpSpPr>
+        <a:xfrm>
+          <a:off x="0" y="0"/>
+          <a:ext cx="0" cy="0"/>
+          <a:chOff x="0" y="0"/>
+          <a:chExt cx="0" cy="0"/>
+        </a:xfrm>
+      </p:grpSpPr>
+      <p:sp>
+        <p:nvSpPr>
+          <p:cNvPr id="2" name="Title 1">
+            <a:extLst>
+              <a:ext uri="{FF2B5EF4-FFF2-40B4-BE49-F238E27FC236}">
+                <a16:creationId xmlns:a16="http://schemas.microsoft.com/office/drawing/2014/main" id="{97D7170C-9AFD-A637-C968-5A6F4F983FAE}"/>
+              </a:ext>
+            </a:extLst>
+          </p:cNvPr>
+          <p:cNvSpPr>
+            <a:spLocks noGrp="1"/>
+          </p:cNvSpPr>
+          <p:nvPr>
+            <p:ph type="title"/>
+          </p:nvPr>
+        </p:nvSpPr>
+        <p:spPr/>
+        <p:txBody>
+          <a:bodyPr/>
+          <a:lstStyle/>
+          <a:p>
+            <a:r>
+              <a:rPr lang="en-US" dirty="0"/>
+              <a:t>Exceptions</a:t>
+            </a:r>
+          </a:p>
+        </p:txBody>
+      </p:sp>
+      <p:grpSp>
+        <p:nvGrpSpPr>
+          <p:cNvPr id="9" name="Group 8">
+            <a:extLst>
+              <a:ext uri="{FF2B5EF4-FFF2-40B4-BE49-F238E27FC236}">
+                <a16:creationId xmlns:a16="http://schemas.microsoft.com/office/drawing/2014/main" id="{D5DF4C49-5010-75D4-9C9A-FC2EA79CBA5C}"/>
+              </a:ext>
+            </a:extLst>
+          </p:cNvPr>
+          <p:cNvGrpSpPr/>
+          <p:nvPr/>
+        </p:nvGrpSpPr>
+        <p:grpSpPr>
+          <a:xfrm>
+            <a:off x="5199845" y="4882756"/>
+            <a:ext cx="1792309" cy="539958"/>
+            <a:chOff x="5055476" y="4635062"/>
+            <a:chExt cx="1792309" cy="539958"/>
+          </a:xfrm>
+        </p:grpSpPr>
+        <p:sp>
+          <p:nvSpPr>
+            <p:cNvPr id="6" name="TextBox 5">
+              <a:extLst>
+                <a:ext uri="{FF2B5EF4-FFF2-40B4-BE49-F238E27FC236}">
+                  <a16:creationId xmlns:a16="http://schemas.microsoft.com/office/drawing/2014/main" id="{0021E430-C792-89F2-BE22-1B584AA1B020}"/>
+                </a:ext>
+              </a:extLst>
+            </p:cNvPr>
+            <p:cNvSpPr txBox="1"/>
+            <p:nvPr/>
+          </p:nvSpPr>
+          <p:spPr>
+            <a:xfrm>
+              <a:off x="5122954" y="4651800"/>
+              <a:ext cx="1724831" cy="523220"/>
+            </a:xfrm>
+            <a:prstGeom prst="rect">
+              <a:avLst/>
+            </a:prstGeom>
+            <a:noFill/>
+          </p:spPr>
+          <p:txBody>
+            <a:bodyPr wrap="none" rtlCol="0">
+              <a:spAutoFit/>
+            </a:bodyPr>
+            <a:lstStyle/>
+            <a:p>
+              <a:r>
+                <a:rPr lang="en-US" sz="2800" dirty="0"/>
+                <a:t>Call stack</a:t>
+              </a:r>
+            </a:p>
+          </p:txBody>
+        </p:sp>
+        <p:cxnSp>
+          <p:nvCxnSpPr>
+            <p:cNvPr id="8" name="Straight Connector 7">
+              <a:extLst>
+                <a:ext uri="{FF2B5EF4-FFF2-40B4-BE49-F238E27FC236}">
+                  <a16:creationId xmlns:a16="http://schemas.microsoft.com/office/drawing/2014/main" id="{A48FAF7A-6F49-F552-580C-409E89B91965}"/>
+                </a:ext>
+              </a:extLst>
+            </p:cNvPr>
+            <p:cNvCxnSpPr/>
+            <p:nvPr/>
+          </p:nvCxnSpPr>
+          <p:spPr>
+            <a:xfrm>
+              <a:off x="5055476" y="4635062"/>
+              <a:ext cx="1702676" cy="0"/>
+            </a:xfrm>
+            <a:prstGeom prst="line">
+              <a:avLst/>
+            </a:prstGeom>
+          </p:spPr>
+          <p:style>
+            <a:lnRef idx="2">
+              <a:schemeClr val="accent1"/>
+            </a:lnRef>
+            <a:fillRef idx="0">
+              <a:schemeClr val="accent1"/>
+            </a:fillRef>
+            <a:effectRef idx="1">
+              <a:schemeClr val="accent1"/>
+            </a:effectRef>
+            <a:fontRef idx="minor">
+              <a:schemeClr val="tx1"/>
+            </a:fontRef>
+          </p:style>
+        </p:cxnSp>
+      </p:grpSp>
+      <p:sp>
+        <p:nvSpPr>
+          <p:cNvPr id="10" name="TextBox 9">
+            <a:extLst>
+              <a:ext uri="{FF2B5EF4-FFF2-40B4-BE49-F238E27FC236}">
+                <a16:creationId xmlns:a16="http://schemas.microsoft.com/office/drawing/2014/main" id="{9BDFB163-149A-9593-8AE3-B24B19C501BF}"/>
+              </a:ext>
+            </a:extLst>
+          </p:cNvPr>
+          <p:cNvSpPr txBox="1"/>
+          <p:nvPr/>
+        </p:nvSpPr>
+        <p:spPr>
+          <a:xfrm>
+            <a:off x="5563611" y="4214232"/>
+            <a:ext cx="1175322" cy="523220"/>
+          </a:xfrm>
+          <a:prstGeom prst="rect">
+            <a:avLst/>
+          </a:prstGeom>
+          <a:noFill/>
+        </p:spPr>
+        <p:txBody>
+          <a:bodyPr wrap="none" rtlCol="0">
+            <a:spAutoFit/>
+          </a:bodyPr>
+          <a:lstStyle/>
+          <a:p>
+            <a:r>
+              <a:rPr lang="en-US" sz="2800" dirty="0"/>
+              <a:t>main()</a:t>
+            </a:r>
+          </a:p>
+        </p:txBody>
+      </p:sp>
+      <p:sp>
+        <p:nvSpPr>
+          <p:cNvPr id="11" name="TextBox 10">
+            <a:extLst>
+              <a:ext uri="{FF2B5EF4-FFF2-40B4-BE49-F238E27FC236}">
+                <a16:creationId xmlns:a16="http://schemas.microsoft.com/office/drawing/2014/main" id="{218E5B8A-B05E-9726-BD06-ECCE4F4E5843}"/>
+              </a:ext>
+            </a:extLst>
+          </p:cNvPr>
+          <p:cNvSpPr txBox="1"/>
+          <p:nvPr/>
+        </p:nvSpPr>
+        <p:spPr>
+          <a:xfrm>
+            <a:off x="5751963" y="3740796"/>
+            <a:ext cx="587020" cy="523220"/>
+          </a:xfrm>
+          <a:prstGeom prst="rect">
+            <a:avLst/>
+          </a:prstGeom>
+          <a:noFill/>
+        </p:spPr>
+        <p:txBody>
+          <a:bodyPr wrap="none" rtlCol="0">
+            <a:spAutoFit/>
+          </a:bodyPr>
+          <a:lstStyle/>
+          <a:p>
+            <a:r>
+              <a:rPr lang="en-US" sz="2800" dirty="0"/>
+              <a:t>a()</a:t>
+            </a:r>
+          </a:p>
+        </p:txBody>
+      </p:sp>
+      <p:sp>
+        <p:nvSpPr>
+          <p:cNvPr id="12" name="TextBox 11">
+            <a:extLst>
+              <a:ext uri="{FF2B5EF4-FFF2-40B4-BE49-F238E27FC236}">
+                <a16:creationId xmlns:a16="http://schemas.microsoft.com/office/drawing/2014/main" id="{A3509CDB-BF61-1F50-8AD3-178436B29412}"/>
+              </a:ext>
+            </a:extLst>
+          </p:cNvPr>
+          <p:cNvSpPr txBox="1"/>
+          <p:nvPr/>
+        </p:nvSpPr>
+        <p:spPr>
+          <a:xfrm>
+            <a:off x="5746353" y="3267360"/>
+            <a:ext cx="598241" cy="523220"/>
+          </a:xfrm>
+          <a:prstGeom prst="rect">
+            <a:avLst/>
+          </a:prstGeom>
+          <a:noFill/>
+        </p:spPr>
+        <p:txBody>
+          <a:bodyPr wrap="none" rtlCol="0">
+            <a:spAutoFit/>
+          </a:bodyPr>
+          <a:lstStyle/>
+          <a:p>
+            <a:r>
+              <a:rPr lang="en-US" sz="2800" dirty="0"/>
+              <a:t>b()</a:t>
+            </a:r>
+          </a:p>
+        </p:txBody>
+      </p:sp>
+      <p:sp>
+        <p:nvSpPr>
+          <p:cNvPr id="13" name="TextBox 12">
+            <a:extLst>
+              <a:ext uri="{FF2B5EF4-FFF2-40B4-BE49-F238E27FC236}">
+                <a16:creationId xmlns:a16="http://schemas.microsoft.com/office/drawing/2014/main" id="{1420875A-CC40-5AF5-1BE9-765D37A23AF8}"/>
+              </a:ext>
+            </a:extLst>
+          </p:cNvPr>
+          <p:cNvSpPr txBox="1"/>
+          <p:nvPr/>
+        </p:nvSpPr>
+        <p:spPr>
+          <a:xfrm>
+            <a:off x="5752765" y="2793924"/>
+            <a:ext cx="585417" cy="523220"/>
+          </a:xfrm>
+          <a:prstGeom prst="rect">
+            <a:avLst/>
+          </a:prstGeom>
+          <a:noFill/>
+        </p:spPr>
+        <p:txBody>
+          <a:bodyPr wrap="none" rtlCol="0">
+            <a:spAutoFit/>
+          </a:bodyPr>
+          <a:lstStyle/>
+          <a:p>
+            <a:r>
+              <a:rPr lang="en-US" sz="2800" dirty="0"/>
+              <a:t>c()</a:t>
+            </a:r>
+          </a:p>
+        </p:txBody>
+      </p:sp>
+      <p:sp>
+        <p:nvSpPr>
+          <p:cNvPr id="18" name="TextBox 17">
+            <a:extLst>
+              <a:ext uri="{FF2B5EF4-FFF2-40B4-BE49-F238E27FC236}">
+                <a16:creationId xmlns:a16="http://schemas.microsoft.com/office/drawing/2014/main" id="{00B0DE62-3559-77CE-A840-B0DD5AA6D8E8}"/>
+              </a:ext>
+            </a:extLst>
+          </p:cNvPr>
+          <p:cNvSpPr txBox="1"/>
+          <p:nvPr/>
+        </p:nvSpPr>
+        <p:spPr>
+          <a:xfrm>
+            <a:off x="7364883" y="2067031"/>
+            <a:ext cx="3252553" cy="1200329"/>
+          </a:xfrm>
+          <a:prstGeom prst="rect">
+            <a:avLst/>
+          </a:prstGeom>
+          <a:solidFill>
+            <a:schemeClr val="accent3">
+              <a:lumMod val="20000"/>
+              <a:lumOff val="80000"/>
+            </a:schemeClr>
+          </a:solidFill>
+        </p:spPr>
+        <p:txBody>
+          <a:bodyPr wrap="square" rtlCol="0">
+            <a:spAutoFit/>
+          </a:bodyPr>
+          <a:lstStyle/>
+          <a:p>
+            <a:pPr algn="ctr"/>
+            <a:r>
+              <a:rPr lang="en-US" dirty="0">
+                <a:cs typeface="Consolas" panose="020B0609020204030204" pitchFamily="49" charset="0"/>
+              </a:rPr>
+              <a:t>If no try/catch block in any of the functions catches the exception, it propagates to </a:t>
+            </a:r>
+            <a:r>
+              <a:rPr lang="en-US" dirty="0">
+                <a:latin typeface="Consolas" panose="020B0609020204030204" pitchFamily="49" charset="0"/>
+                <a:cs typeface="Consolas" panose="020B0609020204030204" pitchFamily="49" charset="0"/>
+              </a:rPr>
+              <a:t>main</a:t>
+            </a:r>
+            <a:r>
+              <a:rPr lang="en-US" dirty="0">
+                <a:cs typeface="Consolas" panose="020B0609020204030204" pitchFamily="49" charset="0"/>
+              </a:rPr>
+              <a:t> and crashes the program.</a:t>
+            </a:r>
+          </a:p>
+        </p:txBody>
+      </p:sp>
+      <p:sp>
+        <p:nvSpPr>
+          <p:cNvPr id="4" name="Freeform 3">
+            <a:extLst>
+              <a:ext uri="{FF2B5EF4-FFF2-40B4-BE49-F238E27FC236}">
+                <a16:creationId xmlns:a16="http://schemas.microsoft.com/office/drawing/2014/main" id="{AF1C81F4-1BCE-67A3-A84B-EBC6B3CB3A6F}"/>
+              </a:ext>
+            </a:extLst>
+          </p:cNvPr>
+          <p:cNvSpPr/>
+          <p:nvPr/>
+        </p:nvSpPr>
+        <p:spPr>
+          <a:xfrm>
+            <a:off x="6351006" y="3055809"/>
+            <a:ext cx="483485" cy="462455"/>
+          </a:xfrm>
+          <a:custGeom>
+            <a:avLst/>
+            <a:gdLst>
+              <a:gd name="csX0" fmla="*/ 10511 w 483485"/>
+              <a:gd name="csY0" fmla="*/ 0 h 462455"/>
+              <a:gd name="csX1" fmla="*/ 483476 w 483485"/>
+              <a:gd name="csY1" fmla="*/ 304800 h 462455"/>
+              <a:gd name="csX2" fmla="*/ 0 w 483485"/>
+              <a:gd name="csY2" fmla="*/ 462455 h 462455"/>
+            </a:gdLst>
+            <a:ahLst/>
+            <a:cxnLst>
+              <a:cxn ang="0">
+                <a:pos x="csX0" y="csY0"/>
+              </a:cxn>
+              <a:cxn ang="0">
+                <a:pos x="csX1" y="csY1"/>
+              </a:cxn>
+              <a:cxn ang="0">
+                <a:pos x="csX2" y="csY2"/>
+              </a:cxn>
+            </a:cxnLst>
+            <a:rect l="l" t="t" r="r" b="b"/>
+            <a:pathLst>
+              <a:path w="483485" h="462455">
+                <a:moveTo>
+                  <a:pt x="10511" y="0"/>
+                </a:moveTo>
+                <a:cubicBezTo>
+                  <a:pt x="247869" y="113862"/>
+                  <a:pt x="485228" y="227724"/>
+                  <a:pt x="483476" y="304800"/>
+                </a:cubicBezTo>
+                <a:cubicBezTo>
+                  <a:pt x="481724" y="381876"/>
+                  <a:pt x="240862" y="422165"/>
+                  <a:pt x="0" y="462455"/>
+                </a:cubicBezTo>
+              </a:path>
+            </a:pathLst>
+          </a:custGeom>
+          <a:noFill/>
+          <a:ln>
+            <a:solidFill>
+              <a:schemeClr val="accent1"/>
+            </a:solidFill>
+            <a:tailEnd type="triangle"/>
+          </a:ln>
+        </p:spPr>
+        <p:style>
+          <a:lnRef idx="2">
+            <a:schemeClr val="accent1">
+              <a:shade val="15000"/>
+            </a:schemeClr>
+          </a:lnRef>
+          <a:fillRef idx="1">
+            <a:schemeClr val="accent1"/>
+          </a:fillRef>
+          <a:effectRef idx="0">
+            <a:schemeClr val="accent1"/>
+          </a:effectRef>
+          <a:fontRef idx="minor">
+            <a:schemeClr val="lt1"/>
+          </a:fontRef>
+        </p:style>
+        <p:txBody>
+          <a:bodyPr rtlCol="0" anchor="ctr"/>
+          <a:lstStyle/>
+          <a:p>
+            <a:pPr algn="ctr"/>
+            <a:endParaRPr lang="en-US"/>
+          </a:p>
+        </p:txBody>
+      </p:sp>
+      <p:sp>
+        <p:nvSpPr>
+          <p:cNvPr id="15" name="Freeform 14">
+            <a:extLst>
+              <a:ext uri="{FF2B5EF4-FFF2-40B4-BE49-F238E27FC236}">
+                <a16:creationId xmlns:a16="http://schemas.microsoft.com/office/drawing/2014/main" id="{A82883C9-24A9-8A1B-4184-F1D3DC52C7C2}"/>
+              </a:ext>
+            </a:extLst>
+          </p:cNvPr>
+          <p:cNvSpPr/>
+          <p:nvPr/>
+        </p:nvSpPr>
+        <p:spPr>
+          <a:xfrm>
+            <a:off x="6351006" y="3606473"/>
+            <a:ext cx="483485" cy="462455"/>
+          </a:xfrm>
+          <a:custGeom>
+            <a:avLst/>
+            <a:gdLst>
+              <a:gd name="csX0" fmla="*/ 10511 w 483485"/>
+              <a:gd name="csY0" fmla="*/ 0 h 462455"/>
+              <a:gd name="csX1" fmla="*/ 483476 w 483485"/>
+              <a:gd name="csY1" fmla="*/ 304800 h 462455"/>
+              <a:gd name="csX2" fmla="*/ 0 w 483485"/>
+              <a:gd name="csY2" fmla="*/ 462455 h 462455"/>
+            </a:gdLst>
+            <a:ahLst/>
+            <a:cxnLst>
+              <a:cxn ang="0">
+                <a:pos x="csX0" y="csY0"/>
+              </a:cxn>
+              <a:cxn ang="0">
+                <a:pos x="csX1" y="csY1"/>
+              </a:cxn>
+              <a:cxn ang="0">
+                <a:pos x="csX2" y="csY2"/>
+              </a:cxn>
+            </a:cxnLst>
+            <a:rect l="l" t="t" r="r" b="b"/>
+            <a:pathLst>
+              <a:path w="483485" h="462455">
+                <a:moveTo>
+                  <a:pt x="10511" y="0"/>
+                </a:moveTo>
+                <a:cubicBezTo>
+                  <a:pt x="247869" y="113862"/>
+                  <a:pt x="485228" y="227724"/>
+                  <a:pt x="483476" y="304800"/>
+                </a:cubicBezTo>
+                <a:cubicBezTo>
+                  <a:pt x="481724" y="381876"/>
+                  <a:pt x="240862" y="422165"/>
+                  <a:pt x="0" y="462455"/>
+                </a:cubicBezTo>
+              </a:path>
+            </a:pathLst>
+          </a:custGeom>
+          <a:noFill/>
+          <a:ln>
+            <a:solidFill>
+              <a:schemeClr val="accent1"/>
+            </a:solidFill>
+            <a:tailEnd type="triangle"/>
+          </a:ln>
+        </p:spPr>
+        <p:style>
+          <a:lnRef idx="2">
+            <a:schemeClr val="accent1">
+              <a:shade val="15000"/>
+            </a:schemeClr>
+          </a:lnRef>
+          <a:fillRef idx="1">
+            <a:schemeClr val="accent1"/>
+          </a:fillRef>
+          <a:effectRef idx="0">
+            <a:schemeClr val="accent1"/>
+          </a:effectRef>
+          <a:fontRef idx="minor">
+            <a:schemeClr val="lt1"/>
+          </a:fontRef>
+        </p:style>
+        <p:txBody>
+          <a:bodyPr rtlCol="0" anchor="ctr"/>
+          <a:lstStyle/>
+          <a:p>
+            <a:pPr algn="ctr"/>
+            <a:endParaRPr lang="en-US"/>
+          </a:p>
+        </p:txBody>
+      </p:sp>
+      <p:sp>
+        <p:nvSpPr>
+          <p:cNvPr id="17" name="Freeform 16">
+            <a:extLst>
+              <a:ext uri="{FF2B5EF4-FFF2-40B4-BE49-F238E27FC236}">
+                <a16:creationId xmlns:a16="http://schemas.microsoft.com/office/drawing/2014/main" id="{2BFA6F96-5502-4BF3-AE79-BEDFF3A57504}"/>
+              </a:ext>
+            </a:extLst>
+          </p:cNvPr>
+          <p:cNvSpPr/>
+          <p:nvPr/>
+        </p:nvSpPr>
+        <p:spPr>
+          <a:xfrm>
+            <a:off x="6411310" y="4172607"/>
+            <a:ext cx="680364" cy="346841"/>
+          </a:xfrm>
+          <a:custGeom>
+            <a:avLst/>
+            <a:gdLst>
+              <a:gd name="csX0" fmla="*/ 0 w 680364"/>
+              <a:gd name="csY0" fmla="*/ 0 h 346841"/>
+              <a:gd name="csX1" fmla="*/ 672662 w 680364"/>
+              <a:gd name="csY1" fmla="*/ 220717 h 346841"/>
+              <a:gd name="csX2" fmla="*/ 304800 w 680364"/>
+              <a:gd name="csY2" fmla="*/ 346841 h 346841"/>
+            </a:gdLst>
+            <a:ahLst/>
+            <a:cxnLst>
+              <a:cxn ang="0">
+                <a:pos x="csX0" y="csY0"/>
+              </a:cxn>
+              <a:cxn ang="0">
+                <a:pos x="csX1" y="csY1"/>
+              </a:cxn>
+              <a:cxn ang="0">
+                <a:pos x="csX2" y="csY2"/>
+              </a:cxn>
+            </a:cxnLst>
+            <a:rect l="l" t="t" r="r" b="b"/>
+            <a:pathLst>
+              <a:path w="680364" h="346841">
+                <a:moveTo>
+                  <a:pt x="0" y="0"/>
+                </a:moveTo>
+                <a:cubicBezTo>
+                  <a:pt x="310931" y="81455"/>
+                  <a:pt x="621862" y="162910"/>
+                  <a:pt x="672662" y="220717"/>
+                </a:cubicBezTo>
+                <a:cubicBezTo>
+                  <a:pt x="723462" y="278524"/>
+                  <a:pt x="514131" y="312682"/>
+                  <a:pt x="304800" y="346841"/>
+                </a:cubicBezTo>
+              </a:path>
+            </a:pathLst>
+          </a:custGeom>
+          <a:noFill/>
+          <a:ln>
+            <a:solidFill>
+              <a:schemeClr val="accent1"/>
+            </a:solidFill>
+            <a:tailEnd type="triangle"/>
+          </a:ln>
+        </p:spPr>
+        <p:style>
+          <a:lnRef idx="2">
+            <a:schemeClr val="accent1">
+              <a:shade val="15000"/>
+            </a:schemeClr>
+          </a:lnRef>
+          <a:fillRef idx="1">
+            <a:schemeClr val="accent1"/>
+          </a:fillRef>
+          <a:effectRef idx="0">
+            <a:schemeClr val="accent1"/>
+          </a:effectRef>
+          <a:fontRef idx="minor">
+            <a:schemeClr val="lt1"/>
+          </a:fontRef>
+        </p:style>
+        <p:txBody>
+          <a:bodyPr rtlCol="0" anchor="ctr"/>
+          <a:lstStyle/>
+          <a:p>
+            <a:pPr algn="ctr"/>
+            <a:endParaRPr lang="en-US"/>
+          </a:p>
+        </p:txBody>
+      </p:sp>
+      <p:sp>
+        <p:nvSpPr>
+          <p:cNvPr id="19" name="Freeform 18">
+            <a:extLst>
+              <a:ext uri="{FF2B5EF4-FFF2-40B4-BE49-F238E27FC236}">
+                <a16:creationId xmlns:a16="http://schemas.microsoft.com/office/drawing/2014/main" id="{C484F1E2-09DB-BDC9-AB8F-2EA17D21F1CE}"/>
+              </a:ext>
+            </a:extLst>
+          </p:cNvPr>
+          <p:cNvSpPr/>
+          <p:nvPr/>
+        </p:nvSpPr>
+        <p:spPr>
+          <a:xfrm>
+            <a:off x="6771503" y="4609070"/>
+            <a:ext cx="758101" cy="766119"/>
+          </a:xfrm>
+          <a:custGeom>
+            <a:avLst/>
+            <a:gdLst>
+              <a:gd name="csX0" fmla="*/ 0 w 758101"/>
+              <a:gd name="csY0" fmla="*/ 0 h 766119"/>
+              <a:gd name="csX1" fmla="*/ 729048 w 758101"/>
+              <a:gd name="csY1" fmla="*/ 234779 h 766119"/>
+              <a:gd name="csX2" fmla="*/ 543697 w 758101"/>
+              <a:gd name="csY2" fmla="*/ 766119 h 766119"/>
+            </a:gdLst>
+            <a:ahLst/>
+            <a:cxnLst>
+              <a:cxn ang="0">
+                <a:pos x="csX0" y="csY0"/>
+              </a:cxn>
+              <a:cxn ang="0">
+                <a:pos x="csX1" y="csY1"/>
+              </a:cxn>
+              <a:cxn ang="0">
+                <a:pos x="csX2" y="csY2"/>
+              </a:cxn>
+            </a:cxnLst>
+            <a:rect l="l" t="t" r="r" b="b"/>
+            <a:pathLst>
+              <a:path w="758101" h="766119">
+                <a:moveTo>
+                  <a:pt x="0" y="0"/>
+                </a:moveTo>
+                <a:cubicBezTo>
+                  <a:pt x="319216" y="53546"/>
+                  <a:pt x="638432" y="107093"/>
+                  <a:pt x="729048" y="234779"/>
+                </a:cubicBezTo>
+                <a:cubicBezTo>
+                  <a:pt x="819664" y="362465"/>
+                  <a:pt x="681680" y="564292"/>
+                  <a:pt x="543697" y="766119"/>
+                </a:cubicBezTo>
+              </a:path>
+            </a:pathLst>
+          </a:custGeom>
+          <a:noFill/>
+          <a:ln>
+            <a:solidFill>
+              <a:schemeClr val="accent1"/>
+            </a:solidFill>
+            <a:tailEnd type="triangle"/>
+          </a:ln>
+        </p:spPr>
+        <p:style>
+          <a:lnRef idx="2">
+            <a:schemeClr val="accent1">
+              <a:shade val="15000"/>
+            </a:schemeClr>
+          </a:lnRef>
+          <a:fillRef idx="1">
+            <a:schemeClr val="accent1"/>
+          </a:fillRef>
+          <a:effectRef idx="0">
+            <a:schemeClr val="accent1"/>
+          </a:effectRef>
+          <a:fontRef idx="minor">
+            <a:schemeClr val="lt1"/>
+          </a:fontRef>
+        </p:style>
+        <p:txBody>
+          <a:bodyPr rtlCol="0" anchor="ctr"/>
+          <a:lstStyle/>
+          <a:p>
+            <a:pPr algn="ctr"/>
+            <a:endParaRPr lang="en-US"/>
+          </a:p>
+        </p:txBody>
+      </p:sp>
+      <p:sp>
+        <p:nvSpPr>
+          <p:cNvPr id="20" name="TextBox 19">
+            <a:extLst>
+              <a:ext uri="{FF2B5EF4-FFF2-40B4-BE49-F238E27FC236}">
+                <a16:creationId xmlns:a16="http://schemas.microsoft.com/office/drawing/2014/main" id="{E4486A5A-BAC8-B4F4-CB82-D6891BC4E4DC}"/>
+              </a:ext>
+            </a:extLst>
+          </p:cNvPr>
+          <p:cNvSpPr txBox="1"/>
+          <p:nvPr/>
+        </p:nvSpPr>
+        <p:spPr>
+          <a:xfrm>
+            <a:off x="6834491" y="5439451"/>
+            <a:ext cx="844655" cy="369332"/>
+          </a:xfrm>
+          <a:prstGeom prst="rect">
+            <a:avLst/>
+          </a:prstGeom>
+          <a:noFill/>
+        </p:spPr>
+        <p:txBody>
+          <a:bodyPr wrap="none" rtlCol="0">
+            <a:spAutoFit/>
+          </a:bodyPr>
+          <a:lstStyle/>
+          <a:p>
+            <a:r>
+              <a:rPr lang="en-US" dirty="0">
+                <a:solidFill>
+                  <a:srgbClr val="FF0000"/>
+                </a:solidFill>
+              </a:rPr>
+              <a:t>Crash!</a:t>
+            </a:r>
+          </a:p>
+        </p:txBody>
+      </p:sp>
+      <p:sp>
+        <p:nvSpPr>
+          <p:cNvPr id="22" name="TextBox 21">
+            <a:extLst>
+              <a:ext uri="{FF2B5EF4-FFF2-40B4-BE49-F238E27FC236}">
+                <a16:creationId xmlns:a16="http://schemas.microsoft.com/office/drawing/2014/main" id="{7F1A72B4-64FE-1CE7-57D2-CD3E4D789187}"/>
+              </a:ext>
+            </a:extLst>
+          </p:cNvPr>
+          <p:cNvSpPr txBox="1"/>
+          <p:nvPr/>
+        </p:nvSpPr>
+        <p:spPr>
+          <a:xfrm>
+            <a:off x="8310592" y="3712303"/>
+            <a:ext cx="2388940" cy="923330"/>
+          </a:xfrm>
+          <a:prstGeom prst="rect">
+            <a:avLst/>
+          </a:prstGeom>
+          <a:solidFill>
+            <a:schemeClr val="accent3">
+              <a:lumMod val="20000"/>
+              <a:lumOff val="80000"/>
+            </a:schemeClr>
+          </a:solidFill>
+        </p:spPr>
+        <p:txBody>
+          <a:bodyPr wrap="square" rtlCol="0">
+            <a:spAutoFit/>
+          </a:bodyPr>
+          <a:lstStyle/>
+          <a:p>
+            <a:pPr algn="ctr"/>
+            <a:r>
+              <a:rPr lang="en-US" dirty="0">
+                <a:cs typeface="Consolas" panose="020B0609020204030204" pitchFamily="49" charset="0"/>
+              </a:rPr>
+              <a:t>Destructors are correctly called as the exception propagates.</a:t>
+            </a:r>
+          </a:p>
+        </p:txBody>
+      </p:sp>
+    </p:spTree>
+    <p:extLst>
+      <p:ext uri="{BB962C8B-B14F-4D97-AF65-F5344CB8AC3E}">
+        <p14:creationId xmlns:p14="http://schemas.microsoft.com/office/powerpoint/2010/main" val="884525296"/>
+      </p:ext>
+    </p:extLst>
+  </p:cSld>
+  <p:clrMapOvr>
+    <a:masterClrMapping/>
+  </p:clrMapOvr>
+</p:sld>
+</file>
+
+<file path=ppt/slides/slide21.xml><?xml version="1.0" encoding="utf-8"?>
+<p:sld xmlns:a="http://schemas.openxmlformats.org/drawingml/2006/main" xmlns:r="http://schemas.openxmlformats.org/officeDocument/2006/relationships" xmlns:p="http://schemas.openxmlformats.org/presentationml/2006/main">
+  <p:cSld>
+    <p:spTree>
+      <p:nvGrpSpPr>
+        <p:cNvPr id="1" name=""/>
+        <p:cNvGrpSpPr/>
+        <p:nvPr/>
+      </p:nvGrpSpPr>
+      <p:grpSpPr>
+        <a:xfrm>
+          <a:off x="0" y="0"/>
+          <a:ext cx="0" cy="0"/>
+          <a:chOff x="0" y="0"/>
+          <a:chExt cx="0" cy="0"/>
+        </a:xfrm>
+      </p:grpSpPr>
+      <p:sp>
+        <p:nvSpPr>
+          <p:cNvPr id="2" name="Title 1">
+            <a:extLst>
+              <a:ext uri="{FF2B5EF4-FFF2-40B4-BE49-F238E27FC236}">
+                <a16:creationId xmlns:a16="http://schemas.microsoft.com/office/drawing/2014/main" id="{69D3C949-08F2-82CE-79A3-68DEB0094D36}"/>
+              </a:ext>
+            </a:extLst>
+          </p:cNvPr>
+          <p:cNvSpPr>
+            <a:spLocks noGrp="1"/>
+          </p:cNvSpPr>
+          <p:nvPr>
+            <p:ph type="title"/>
+          </p:nvPr>
+        </p:nvSpPr>
+        <p:spPr/>
+        <p:txBody>
+          <a:bodyPr/>
+          <a:lstStyle/>
+          <a:p>
+            <a:r>
+              <a:rPr lang="en-US" dirty="0"/>
+              <a:t>Exceptions</a:t>
+            </a:r>
+          </a:p>
+        </p:txBody>
+      </p:sp>
+      <p:sp>
+        <p:nvSpPr>
+          <p:cNvPr id="3" name="Content Placeholder 2">
+            <a:extLst>
+              <a:ext uri="{FF2B5EF4-FFF2-40B4-BE49-F238E27FC236}">
+                <a16:creationId xmlns:a16="http://schemas.microsoft.com/office/drawing/2014/main" id="{406C4C09-85D7-6F52-CB93-339DBA77B806}"/>
+              </a:ext>
+            </a:extLst>
+          </p:cNvPr>
+          <p:cNvSpPr>
+            <a:spLocks noGrp="1"/>
+          </p:cNvSpPr>
+          <p:nvPr>
+            <p:ph idx="1"/>
+          </p:nvPr>
+        </p:nvSpPr>
+        <p:spPr/>
+        <p:txBody>
+          <a:bodyPr/>
+          <a:lstStyle/>
+          <a:p>
+            <a:r>
+              <a:rPr lang="en-US" dirty="0"/>
+              <a:t>See </a:t>
+            </a:r>
+            <a:r>
+              <a:rPr lang="en-US" dirty="0" err="1">
+                <a:latin typeface="Consolas" panose="020B0609020204030204" pitchFamily="49" charset="0"/>
+                <a:cs typeface="Consolas" panose="020B0609020204030204" pitchFamily="49" charset="0"/>
+              </a:rPr>
+              <a:t>exception_demo.cpp</a:t>
+            </a:r>
+            <a:r>
+              <a:rPr lang="en-US" dirty="0"/>
+              <a:t> in the notes for examples …</a:t>
+            </a:r>
+          </a:p>
+        </p:txBody>
+      </p:sp>
+    </p:spTree>
+    <p:extLst>
+      <p:ext uri="{BB962C8B-B14F-4D97-AF65-F5344CB8AC3E}">
+        <p14:creationId xmlns:p14="http://schemas.microsoft.com/office/powerpoint/2010/main" val="1787469844"/>
+      </p:ext>
+    </p:extLst>
+  </p:cSld>
+  <p:clrMapOvr>
+    <a:masterClrMapping/>
+  </p:clrMapOvr>
+</p:sld>
+</file>
+
+<file path=ppt/slides/slide22.xml><?xml version="1.0" encoding="utf-8"?>
+<p:sld xmlns:a="http://schemas.openxmlformats.org/drawingml/2006/main" xmlns:r="http://schemas.openxmlformats.org/officeDocument/2006/relationships" xmlns:p="http://schemas.openxmlformats.org/presentationml/2006/main">
+  <p:cSld>
+    <p:spTree>
+      <p:nvGrpSpPr>
+        <p:cNvPr id="1" name=""/>
+        <p:cNvGrpSpPr/>
+        <p:nvPr/>
+      </p:nvGrpSpPr>
+      <p:grpSpPr>
+        <a:xfrm>
+          <a:off x="0" y="0"/>
+          <a:ext cx="0" cy="0"/>
+          <a:chOff x="0" y="0"/>
+          <a:chExt cx="0" cy="0"/>
+        </a:xfrm>
+      </p:grpSpPr>
+      <p:sp>
+        <p:nvSpPr>
+          <p:cNvPr id="2" name="Title 1">
+            <a:extLst>
+              <a:ext uri="{FF2B5EF4-FFF2-40B4-BE49-F238E27FC236}">
+                <a16:creationId xmlns:a16="http://schemas.microsoft.com/office/drawing/2014/main" id="{2567A48D-1F32-1EB2-F5EA-FAF078466E2F}"/>
+              </a:ext>
+            </a:extLst>
+          </p:cNvPr>
+          <p:cNvSpPr>
+            <a:spLocks noGrp="1"/>
+          </p:cNvSpPr>
+          <p:nvPr>
+            <p:ph type="title"/>
+          </p:nvPr>
+        </p:nvSpPr>
+        <p:spPr/>
+        <p:txBody>
+          <a:bodyPr/>
+          <a:lstStyle/>
+          <a:p>
+            <a:r>
+              <a:rPr lang="en-US" dirty="0"/>
+              <a:t>Summary</a:t>
+            </a:r>
+          </a:p>
+        </p:txBody>
+      </p:sp>
+      <p:sp>
+        <p:nvSpPr>
+          <p:cNvPr id="3" name="Content Placeholder 2">
+            <a:extLst>
+              <a:ext uri="{FF2B5EF4-FFF2-40B4-BE49-F238E27FC236}">
+                <a16:creationId xmlns:a16="http://schemas.microsoft.com/office/drawing/2014/main" id="{2908498F-39FA-FB81-9A18-DBFB7CE03695}"/>
+              </a:ext>
+            </a:extLst>
+          </p:cNvPr>
+          <p:cNvSpPr>
+            <a:spLocks noGrp="1"/>
+          </p:cNvSpPr>
+          <p:nvPr>
+            <p:ph idx="1"/>
+          </p:nvPr>
+        </p:nvSpPr>
+        <p:spPr/>
+        <p:txBody>
+          <a:bodyPr/>
+          <a:lstStyle/>
+          <a:p>
+            <a:r>
+              <a:rPr lang="en-US" b="1" dirty="0"/>
+              <a:t>Exceptions</a:t>
+            </a:r>
+            <a:r>
+              <a:rPr lang="en-US" dirty="0"/>
+              <a:t> are objects that represent serious errors</a:t>
+            </a:r>
+          </a:p>
+          <a:p>
+            <a:r>
+              <a:rPr lang="en-US" dirty="0"/>
+              <a:t>They are created with </a:t>
+            </a:r>
+            <a:r>
+              <a:rPr lang="en-US" b="1" dirty="0"/>
+              <a:t>throw</a:t>
+            </a:r>
+          </a:p>
+          <a:p>
+            <a:r>
+              <a:rPr lang="en-US" dirty="0"/>
+              <a:t>You can handle them with a </a:t>
+            </a:r>
+            <a:r>
+              <a:rPr lang="en-US" b="1" dirty="0"/>
+              <a:t>try/catch block</a:t>
+            </a:r>
+          </a:p>
+          <a:p>
+            <a:r>
+              <a:rPr lang="en-US" dirty="0"/>
+              <a:t>An </a:t>
+            </a:r>
+            <a:r>
+              <a:rPr lang="en-US" b="1" dirty="0"/>
+              <a:t>uncaught exception </a:t>
+            </a:r>
+            <a:r>
+              <a:rPr lang="en-US" dirty="0"/>
+              <a:t>propagates through all the functions on the call stack, and if none catch it it will crash the program</a:t>
+            </a:r>
+          </a:p>
+          <a:p>
+            <a:r>
+              <a:rPr lang="en-US" dirty="0"/>
+              <a:t>Object </a:t>
+            </a:r>
+            <a:r>
+              <a:rPr lang="en-US" b="1" dirty="0"/>
+              <a:t>destructors</a:t>
+            </a:r>
+            <a:r>
+              <a:rPr lang="en-US" dirty="0"/>
+              <a:t> are called correctly with exceptions</a:t>
+            </a:r>
+          </a:p>
+          <a:p>
+            <a:pPr lvl="1"/>
+            <a:r>
+              <a:rPr lang="en-US" dirty="0"/>
+              <a:t>Use </a:t>
+            </a:r>
+            <a:r>
+              <a:rPr lang="en-US" b="1" dirty="0"/>
+              <a:t>RAII</a:t>
+            </a:r>
+            <a:r>
+              <a:rPr lang="en-US" dirty="0"/>
+              <a:t> to avoid memory leaks and related errors</a:t>
+            </a:r>
+          </a:p>
+          <a:p>
+            <a:pPr lvl="1"/>
+            <a:r>
+              <a:rPr lang="en-US" dirty="0"/>
+              <a:t>Another approach is to use C++’s </a:t>
+            </a:r>
+            <a:r>
+              <a:rPr lang="en-US" b="1" dirty="0"/>
+              <a:t>smart pointers </a:t>
+            </a:r>
+            <a:r>
+              <a:rPr lang="en-US" dirty="0"/>
+              <a:t>(we won’t cover those)</a:t>
+            </a:r>
+          </a:p>
+        </p:txBody>
+      </p:sp>
+    </p:spTree>
+    <p:extLst>
+      <p:ext uri="{BB962C8B-B14F-4D97-AF65-F5344CB8AC3E}">
+        <p14:creationId xmlns:p14="http://schemas.microsoft.com/office/powerpoint/2010/main" val="902908186"/>
       </p:ext>
     </p:extLst>
   </p:cSld>

</xml_diff>